<commit_message>
Update Delivery 3 Presentation.pptx
</commit_message>
<xml_diff>
--- a/Delivery 3/Delivery 3 Presentation.pptx
+++ b/Delivery 3/Delivery 3 Presentation.pptx
@@ -4,6 +4,9 @@
   <p:sldMasterIdLst>
     <p:sldMasterId id="2147483648" r:id="rId1"/>
   </p:sldMasterIdLst>
+  <p:notesMasterIdLst>
+    <p:notesMasterId r:id="rId11"/>
+  </p:notesMasterIdLst>
   <p:sldIdLst>
     <p:sldId id="256" r:id="rId2"/>
     <p:sldId id="262" r:id="rId3"/>
@@ -2095,7 +2098,7 @@
   <dgm:whole/>
   <dgm:extLst>
     <a:ext uri="http://schemas.microsoft.com/office/drawing/2008/diagram">
-      <dsp:dataModelExt xmlns:dsp="http://schemas.microsoft.com/office/drawing/2008/diagram" relId="rId6" minVer="http://schemas.openxmlformats.org/drawingml/2006/diagram"/>
+      <dsp:dataModelExt xmlns:dsp="http://schemas.microsoft.com/office/drawing/2008/diagram" relId="rId7" minVer="http://schemas.openxmlformats.org/drawingml/2006/diagram"/>
     </a:ext>
   </dgm:extLst>
 </dgm:dataModel>
@@ -2863,7 +2866,7 @@
   <dgm:whole/>
   <dgm:extLst>
     <a:ext uri="http://schemas.microsoft.com/office/drawing/2008/diagram">
-      <dsp:dataModelExt xmlns:dsp="http://schemas.microsoft.com/office/drawing/2008/diagram" relId="rId6" minVer="http://schemas.openxmlformats.org/drawingml/2006/diagram"/>
+      <dsp:dataModelExt xmlns:dsp="http://schemas.microsoft.com/office/drawing/2008/diagram" relId="rId7" minVer="http://schemas.openxmlformats.org/drawingml/2006/diagram"/>
     </a:ext>
   </dgm:extLst>
 </dgm:dataModel>
@@ -7175,6 +7178,1272 @@
 </dgm:styleDef>
 </file>
 
+<file path=ppt/notesMasters/notesMaster1.xml><?xml version="1.0" encoding="utf-8"?>
+<p:notesMaster xmlns:a="http://schemas.openxmlformats.org/drawingml/2006/main" xmlns:r="http://schemas.openxmlformats.org/officeDocument/2006/relationships" xmlns:p="http://schemas.openxmlformats.org/presentationml/2006/main">
+  <p:cSld>
+    <p:bg>
+      <p:bgRef idx="1001">
+        <a:schemeClr val="bg1"/>
+      </p:bgRef>
+    </p:bg>
+    <p:spTree>
+      <p:nvGrpSpPr>
+        <p:cNvPr id="1" name=""/>
+        <p:cNvGrpSpPr/>
+        <p:nvPr/>
+      </p:nvGrpSpPr>
+      <p:grpSpPr>
+        <a:xfrm>
+          <a:off x="0" y="0"/>
+          <a:ext cx="0" cy="0"/>
+          <a:chOff x="0" y="0"/>
+          <a:chExt cx="0" cy="0"/>
+        </a:xfrm>
+      </p:grpSpPr>
+      <p:sp>
+        <p:nvSpPr>
+          <p:cNvPr id="2" name="Header Placeholder 1"/>
+          <p:cNvSpPr>
+            <a:spLocks noGrp="1"/>
+          </p:cNvSpPr>
+          <p:nvPr>
+            <p:ph type="hdr" sz="quarter"/>
+          </p:nvPr>
+        </p:nvSpPr>
+        <p:spPr>
+          <a:xfrm>
+            <a:off x="0" y="0"/>
+            <a:ext cx="2971800" cy="458788"/>
+          </a:xfrm>
+          <a:prstGeom prst="rect">
+            <a:avLst/>
+          </a:prstGeom>
+        </p:spPr>
+        <p:txBody>
+          <a:bodyPr vert="horz" lIns="91440" tIns="45720" rIns="91440" bIns="45720" rtlCol="0"/>
+          <a:lstStyle>
+            <a:lvl1pPr algn="l">
+              <a:defRPr sz="1200"/>
+            </a:lvl1pPr>
+          </a:lstStyle>
+          <a:p>
+            <a:endParaRPr lang="en-US"/>
+          </a:p>
+        </p:txBody>
+      </p:sp>
+      <p:sp>
+        <p:nvSpPr>
+          <p:cNvPr id="3" name="Date Placeholder 2"/>
+          <p:cNvSpPr>
+            <a:spLocks noGrp="1"/>
+          </p:cNvSpPr>
+          <p:nvPr>
+            <p:ph type="dt" idx="1"/>
+          </p:nvPr>
+        </p:nvSpPr>
+        <p:spPr>
+          <a:xfrm>
+            <a:off x="3884613" y="0"/>
+            <a:ext cx="2971800" cy="458788"/>
+          </a:xfrm>
+          <a:prstGeom prst="rect">
+            <a:avLst/>
+          </a:prstGeom>
+        </p:spPr>
+        <p:txBody>
+          <a:bodyPr vert="horz" lIns="91440" tIns="45720" rIns="91440" bIns="45720" rtlCol="0"/>
+          <a:lstStyle>
+            <a:lvl1pPr algn="r">
+              <a:defRPr sz="1200"/>
+            </a:lvl1pPr>
+          </a:lstStyle>
+          <a:p>
+            <a:fld id="{7C06C62D-F63F-4EC0-9A1B-15461328B203}" type="datetimeFigureOut">
+              <a:rPr lang="en-US" smtClean="0"/>
+              <a:t>4/6/2020</a:t>
+            </a:fld>
+            <a:endParaRPr lang="en-US"/>
+          </a:p>
+        </p:txBody>
+      </p:sp>
+      <p:sp>
+        <p:nvSpPr>
+          <p:cNvPr id="4" name="Slide Image Placeholder 3"/>
+          <p:cNvSpPr>
+            <a:spLocks noGrp="1" noRot="1" noChangeAspect="1"/>
+          </p:cNvSpPr>
+          <p:nvPr>
+            <p:ph type="sldImg" idx="2"/>
+          </p:nvPr>
+        </p:nvSpPr>
+        <p:spPr>
+          <a:xfrm>
+            <a:off x="685800" y="1143000"/>
+            <a:ext cx="5486400" cy="3086100"/>
+          </a:xfrm>
+          <a:prstGeom prst="rect">
+            <a:avLst/>
+          </a:prstGeom>
+          <a:noFill/>
+          <a:ln w="12700">
+            <a:solidFill>
+              <a:prstClr val="black"/>
+            </a:solidFill>
+          </a:ln>
+        </p:spPr>
+        <p:txBody>
+          <a:bodyPr vert="horz" lIns="91440" tIns="45720" rIns="91440" bIns="45720" rtlCol="0" anchor="ctr"/>
+          <a:lstStyle/>
+          <a:p>
+            <a:endParaRPr lang="en-US"/>
+          </a:p>
+        </p:txBody>
+      </p:sp>
+      <p:sp>
+        <p:nvSpPr>
+          <p:cNvPr id="5" name="Notes Placeholder 4"/>
+          <p:cNvSpPr>
+            <a:spLocks noGrp="1"/>
+          </p:cNvSpPr>
+          <p:nvPr>
+            <p:ph type="body" sz="quarter" idx="3"/>
+          </p:nvPr>
+        </p:nvSpPr>
+        <p:spPr>
+          <a:xfrm>
+            <a:off x="685800" y="4400550"/>
+            <a:ext cx="5486400" cy="3600450"/>
+          </a:xfrm>
+          <a:prstGeom prst="rect">
+            <a:avLst/>
+          </a:prstGeom>
+        </p:spPr>
+        <p:txBody>
+          <a:bodyPr vert="horz" lIns="91440" tIns="45720" rIns="91440" bIns="45720" rtlCol="0"/>
+          <a:lstStyle/>
+          <a:p>
+            <a:pPr lvl="0"/>
+            <a:r>
+              <a:rPr lang="en-US"/>
+              <a:t>Click to edit Master text styles</a:t>
+            </a:r>
+          </a:p>
+          <a:p>
+            <a:pPr lvl="1"/>
+            <a:r>
+              <a:rPr lang="en-US"/>
+              <a:t>Second level</a:t>
+            </a:r>
+          </a:p>
+          <a:p>
+            <a:pPr lvl="2"/>
+            <a:r>
+              <a:rPr lang="en-US"/>
+              <a:t>Third level</a:t>
+            </a:r>
+          </a:p>
+          <a:p>
+            <a:pPr lvl="3"/>
+            <a:r>
+              <a:rPr lang="en-US"/>
+              <a:t>Fourth level</a:t>
+            </a:r>
+          </a:p>
+          <a:p>
+            <a:pPr lvl="4"/>
+            <a:r>
+              <a:rPr lang="en-US"/>
+              <a:t>Fifth level</a:t>
+            </a:r>
+          </a:p>
+        </p:txBody>
+      </p:sp>
+      <p:sp>
+        <p:nvSpPr>
+          <p:cNvPr id="6" name="Footer Placeholder 5"/>
+          <p:cNvSpPr>
+            <a:spLocks noGrp="1"/>
+          </p:cNvSpPr>
+          <p:nvPr>
+            <p:ph type="ftr" sz="quarter" idx="4"/>
+          </p:nvPr>
+        </p:nvSpPr>
+        <p:spPr>
+          <a:xfrm>
+            <a:off x="0" y="8685213"/>
+            <a:ext cx="2971800" cy="458787"/>
+          </a:xfrm>
+          <a:prstGeom prst="rect">
+            <a:avLst/>
+          </a:prstGeom>
+        </p:spPr>
+        <p:txBody>
+          <a:bodyPr vert="horz" lIns="91440" tIns="45720" rIns="91440" bIns="45720" rtlCol="0" anchor="b"/>
+          <a:lstStyle>
+            <a:lvl1pPr algn="l">
+              <a:defRPr sz="1200"/>
+            </a:lvl1pPr>
+          </a:lstStyle>
+          <a:p>
+            <a:endParaRPr lang="en-US"/>
+          </a:p>
+        </p:txBody>
+      </p:sp>
+      <p:sp>
+        <p:nvSpPr>
+          <p:cNvPr id="7" name="Slide Number Placeholder 6"/>
+          <p:cNvSpPr>
+            <a:spLocks noGrp="1"/>
+          </p:cNvSpPr>
+          <p:nvPr>
+            <p:ph type="sldNum" sz="quarter" idx="5"/>
+          </p:nvPr>
+        </p:nvSpPr>
+        <p:spPr>
+          <a:xfrm>
+            <a:off x="3884613" y="8685213"/>
+            <a:ext cx="2971800" cy="458787"/>
+          </a:xfrm>
+          <a:prstGeom prst="rect">
+            <a:avLst/>
+          </a:prstGeom>
+        </p:spPr>
+        <p:txBody>
+          <a:bodyPr vert="horz" lIns="91440" tIns="45720" rIns="91440" bIns="45720" rtlCol="0" anchor="b"/>
+          <a:lstStyle>
+            <a:lvl1pPr algn="r">
+              <a:defRPr sz="1200"/>
+            </a:lvl1pPr>
+          </a:lstStyle>
+          <a:p>
+            <a:fld id="{3E17C3BA-3197-4232-AB5E-8145A7D05623}" type="slidenum">
+              <a:rPr lang="en-US" smtClean="0"/>
+              <a:t>‹#›</a:t>
+            </a:fld>
+            <a:endParaRPr lang="en-US"/>
+          </a:p>
+        </p:txBody>
+      </p:sp>
+    </p:spTree>
+    <p:extLst>
+      <p:ext uri="{BB962C8B-B14F-4D97-AF65-F5344CB8AC3E}">
+        <p14:creationId xmlns:p14="http://schemas.microsoft.com/office/powerpoint/2010/main" val="2380965298"/>
+      </p:ext>
+    </p:extLst>
+  </p:cSld>
+  <p:clrMap bg1="lt1" tx1="dk1" bg2="lt2" tx2="dk2" accent1="accent1" accent2="accent2" accent3="accent3" accent4="accent4" accent5="accent5" accent6="accent6" hlink="hlink" folHlink="folHlink"/>
+  <p:notesStyle>
+    <a:lvl1pPr marL="0" algn="l" defTabSz="914400" rtl="0" eaLnBrk="1" latinLnBrk="0" hangingPunct="1">
+      <a:defRPr sz="1200" kern="1200">
+        <a:solidFill>
+          <a:schemeClr val="tx1"/>
+        </a:solidFill>
+        <a:latin typeface="+mn-lt"/>
+        <a:ea typeface="+mn-ea"/>
+        <a:cs typeface="+mn-cs"/>
+      </a:defRPr>
+    </a:lvl1pPr>
+    <a:lvl2pPr marL="457200" algn="l" defTabSz="914400" rtl="0" eaLnBrk="1" latinLnBrk="0" hangingPunct="1">
+      <a:defRPr sz="1200" kern="1200">
+        <a:solidFill>
+          <a:schemeClr val="tx1"/>
+        </a:solidFill>
+        <a:latin typeface="+mn-lt"/>
+        <a:ea typeface="+mn-ea"/>
+        <a:cs typeface="+mn-cs"/>
+      </a:defRPr>
+    </a:lvl2pPr>
+    <a:lvl3pPr marL="914400" algn="l" defTabSz="914400" rtl="0" eaLnBrk="1" latinLnBrk="0" hangingPunct="1">
+      <a:defRPr sz="1200" kern="1200">
+        <a:solidFill>
+          <a:schemeClr val="tx1"/>
+        </a:solidFill>
+        <a:latin typeface="+mn-lt"/>
+        <a:ea typeface="+mn-ea"/>
+        <a:cs typeface="+mn-cs"/>
+      </a:defRPr>
+    </a:lvl3pPr>
+    <a:lvl4pPr marL="1371600" algn="l" defTabSz="914400" rtl="0" eaLnBrk="1" latinLnBrk="0" hangingPunct="1">
+      <a:defRPr sz="1200" kern="1200">
+        <a:solidFill>
+          <a:schemeClr val="tx1"/>
+        </a:solidFill>
+        <a:latin typeface="+mn-lt"/>
+        <a:ea typeface="+mn-ea"/>
+        <a:cs typeface="+mn-cs"/>
+      </a:defRPr>
+    </a:lvl4pPr>
+    <a:lvl5pPr marL="1828800" algn="l" defTabSz="914400" rtl="0" eaLnBrk="1" latinLnBrk="0" hangingPunct="1">
+      <a:defRPr sz="1200" kern="1200">
+        <a:solidFill>
+          <a:schemeClr val="tx1"/>
+        </a:solidFill>
+        <a:latin typeface="+mn-lt"/>
+        <a:ea typeface="+mn-ea"/>
+        <a:cs typeface="+mn-cs"/>
+      </a:defRPr>
+    </a:lvl5pPr>
+    <a:lvl6pPr marL="2286000" algn="l" defTabSz="914400" rtl="0" eaLnBrk="1" latinLnBrk="0" hangingPunct="1">
+      <a:defRPr sz="1200" kern="1200">
+        <a:solidFill>
+          <a:schemeClr val="tx1"/>
+        </a:solidFill>
+        <a:latin typeface="+mn-lt"/>
+        <a:ea typeface="+mn-ea"/>
+        <a:cs typeface="+mn-cs"/>
+      </a:defRPr>
+    </a:lvl6pPr>
+    <a:lvl7pPr marL="2743200" algn="l" defTabSz="914400" rtl="0" eaLnBrk="1" latinLnBrk="0" hangingPunct="1">
+      <a:defRPr sz="1200" kern="1200">
+        <a:solidFill>
+          <a:schemeClr val="tx1"/>
+        </a:solidFill>
+        <a:latin typeface="+mn-lt"/>
+        <a:ea typeface="+mn-ea"/>
+        <a:cs typeface="+mn-cs"/>
+      </a:defRPr>
+    </a:lvl7pPr>
+    <a:lvl8pPr marL="3200400" algn="l" defTabSz="914400" rtl="0" eaLnBrk="1" latinLnBrk="0" hangingPunct="1">
+      <a:defRPr sz="1200" kern="1200">
+        <a:solidFill>
+          <a:schemeClr val="tx1"/>
+        </a:solidFill>
+        <a:latin typeface="+mn-lt"/>
+        <a:ea typeface="+mn-ea"/>
+        <a:cs typeface="+mn-cs"/>
+      </a:defRPr>
+    </a:lvl8pPr>
+    <a:lvl9pPr marL="3657600" algn="l" defTabSz="914400" rtl="0" eaLnBrk="1" latinLnBrk="0" hangingPunct="1">
+      <a:defRPr sz="1200" kern="1200">
+        <a:solidFill>
+          <a:schemeClr val="tx1"/>
+        </a:solidFill>
+        <a:latin typeface="+mn-lt"/>
+        <a:ea typeface="+mn-ea"/>
+        <a:cs typeface="+mn-cs"/>
+      </a:defRPr>
+    </a:lvl9pPr>
+  </p:notesStyle>
+</p:notesMaster>
+</file>
+
+<file path=ppt/notesSlides/notesSlide1.xml><?xml version="1.0" encoding="utf-8"?>
+<p:notes xmlns:a="http://schemas.openxmlformats.org/drawingml/2006/main" xmlns:r="http://schemas.openxmlformats.org/officeDocument/2006/relationships" xmlns:p="http://schemas.openxmlformats.org/presentationml/2006/main">
+  <p:cSld>
+    <p:spTree>
+      <p:nvGrpSpPr>
+        <p:cNvPr id="1" name=""/>
+        <p:cNvGrpSpPr/>
+        <p:nvPr/>
+      </p:nvGrpSpPr>
+      <p:grpSpPr>
+        <a:xfrm>
+          <a:off x="0" y="0"/>
+          <a:ext cx="0" cy="0"/>
+          <a:chOff x="0" y="0"/>
+          <a:chExt cx="0" cy="0"/>
+        </a:xfrm>
+      </p:grpSpPr>
+      <p:sp>
+        <p:nvSpPr>
+          <p:cNvPr id="2" name="Slide Image Placeholder 1"/>
+          <p:cNvSpPr>
+            <a:spLocks noGrp="1" noRot="1" noChangeAspect="1"/>
+          </p:cNvSpPr>
+          <p:nvPr>
+            <p:ph type="sldImg"/>
+          </p:nvPr>
+        </p:nvSpPr>
+        <p:spPr/>
+      </p:sp>
+      <p:sp>
+        <p:nvSpPr>
+          <p:cNvPr id="3" name="Notes Placeholder 2"/>
+          <p:cNvSpPr>
+            <a:spLocks noGrp="1"/>
+          </p:cNvSpPr>
+          <p:nvPr>
+            <p:ph type="body" idx="1"/>
+          </p:nvPr>
+        </p:nvSpPr>
+        <p:spPr/>
+        <p:txBody>
+          <a:bodyPr/>
+          <a:lstStyle/>
+          <a:p>
+            <a:r>
+              <a:rPr lang="en-US" dirty="0"/>
+              <a:t>Hello everyone, This is Sai Vinay Pabbisetty and I am here to present about my capstone project i.e. on Chicago </a:t>
+            </a:r>
+            <a:r>
+              <a:rPr lang="en-US"/>
+              <a:t>Crime Data Analysis</a:t>
+            </a:r>
+            <a:endParaRPr lang="en-US" dirty="0"/>
+          </a:p>
+        </p:txBody>
+      </p:sp>
+      <p:sp>
+        <p:nvSpPr>
+          <p:cNvPr id="4" name="Slide Number Placeholder 3"/>
+          <p:cNvSpPr>
+            <a:spLocks noGrp="1"/>
+          </p:cNvSpPr>
+          <p:nvPr>
+            <p:ph type="sldNum" sz="quarter" idx="5"/>
+          </p:nvPr>
+        </p:nvSpPr>
+        <p:spPr/>
+        <p:txBody>
+          <a:bodyPr/>
+          <a:lstStyle/>
+          <a:p>
+            <a:fld id="{3E17C3BA-3197-4232-AB5E-8145A7D05623}" type="slidenum">
+              <a:rPr lang="en-US" smtClean="0"/>
+              <a:t>1</a:t>
+            </a:fld>
+            <a:endParaRPr lang="en-US"/>
+          </a:p>
+        </p:txBody>
+      </p:sp>
+    </p:spTree>
+    <p:extLst>
+      <p:ext uri="{BB962C8B-B14F-4D97-AF65-F5344CB8AC3E}">
+        <p14:creationId xmlns:p14="http://schemas.microsoft.com/office/powerpoint/2010/main" val="2899504208"/>
+      </p:ext>
+    </p:extLst>
+  </p:cSld>
+  <p:clrMapOvr>
+    <a:masterClrMapping/>
+  </p:clrMapOvr>
+</p:notes>
+</file>
+
+<file path=ppt/notesSlides/notesSlide2.xml><?xml version="1.0" encoding="utf-8"?>
+<p:notes xmlns:a="http://schemas.openxmlformats.org/drawingml/2006/main" xmlns:r="http://schemas.openxmlformats.org/officeDocument/2006/relationships" xmlns:p="http://schemas.openxmlformats.org/presentationml/2006/main">
+  <p:cSld>
+    <p:spTree>
+      <p:nvGrpSpPr>
+        <p:cNvPr id="1" name=""/>
+        <p:cNvGrpSpPr/>
+        <p:nvPr/>
+      </p:nvGrpSpPr>
+      <p:grpSpPr>
+        <a:xfrm>
+          <a:off x="0" y="0"/>
+          <a:ext cx="0" cy="0"/>
+          <a:chOff x="0" y="0"/>
+          <a:chExt cx="0" cy="0"/>
+        </a:xfrm>
+      </p:grpSpPr>
+      <p:sp>
+        <p:nvSpPr>
+          <p:cNvPr id="2" name="Slide Image Placeholder 1"/>
+          <p:cNvSpPr>
+            <a:spLocks noGrp="1" noRot="1" noChangeAspect="1"/>
+          </p:cNvSpPr>
+          <p:nvPr>
+            <p:ph type="sldImg"/>
+          </p:nvPr>
+        </p:nvSpPr>
+        <p:spPr/>
+      </p:sp>
+      <p:sp>
+        <p:nvSpPr>
+          <p:cNvPr id="3" name="Notes Placeholder 2"/>
+          <p:cNvSpPr>
+            <a:spLocks noGrp="1"/>
+          </p:cNvSpPr>
+          <p:nvPr>
+            <p:ph type="body" idx="1"/>
+          </p:nvPr>
+        </p:nvSpPr>
+        <p:spPr/>
+        <p:txBody>
+          <a:bodyPr/>
+          <a:lstStyle/>
+          <a:p>
+            <a:r>
+              <a:rPr lang="en-US" dirty="0"/>
+              <a:t>For this deliverable I will be focusing on giving you some of project updates and majorly discussing about Exploratory data analysis, Data preprocessing and Data modelling. Also at the end of the presentation I will be discussing about the things I am going to do in next phase of this project.</a:t>
+            </a:r>
+          </a:p>
+        </p:txBody>
+      </p:sp>
+      <p:sp>
+        <p:nvSpPr>
+          <p:cNvPr id="4" name="Slide Number Placeholder 3"/>
+          <p:cNvSpPr>
+            <a:spLocks noGrp="1"/>
+          </p:cNvSpPr>
+          <p:nvPr>
+            <p:ph type="sldNum" sz="quarter" idx="5"/>
+          </p:nvPr>
+        </p:nvSpPr>
+        <p:spPr/>
+        <p:txBody>
+          <a:bodyPr/>
+          <a:lstStyle/>
+          <a:p>
+            <a:fld id="{3E17C3BA-3197-4232-AB5E-8145A7D05623}" type="slidenum">
+              <a:rPr lang="en-US" smtClean="0"/>
+              <a:t>2</a:t>
+            </a:fld>
+            <a:endParaRPr lang="en-US"/>
+          </a:p>
+        </p:txBody>
+      </p:sp>
+    </p:spTree>
+    <p:extLst>
+      <p:ext uri="{BB962C8B-B14F-4D97-AF65-F5344CB8AC3E}">
+        <p14:creationId xmlns:p14="http://schemas.microsoft.com/office/powerpoint/2010/main" val="300109966"/>
+      </p:ext>
+    </p:extLst>
+  </p:cSld>
+  <p:clrMapOvr>
+    <a:masterClrMapping/>
+  </p:clrMapOvr>
+</p:notes>
+</file>
+
+<file path=ppt/notesSlides/notesSlide3.xml><?xml version="1.0" encoding="utf-8"?>
+<p:notes xmlns:a="http://schemas.openxmlformats.org/drawingml/2006/main" xmlns:r="http://schemas.openxmlformats.org/officeDocument/2006/relationships" xmlns:p="http://schemas.openxmlformats.org/presentationml/2006/main">
+  <p:cSld>
+    <p:spTree>
+      <p:nvGrpSpPr>
+        <p:cNvPr id="1" name=""/>
+        <p:cNvGrpSpPr/>
+        <p:nvPr/>
+      </p:nvGrpSpPr>
+      <p:grpSpPr>
+        <a:xfrm>
+          <a:off x="0" y="0"/>
+          <a:ext cx="0" cy="0"/>
+          <a:chOff x="0" y="0"/>
+          <a:chExt cx="0" cy="0"/>
+        </a:xfrm>
+      </p:grpSpPr>
+      <p:sp>
+        <p:nvSpPr>
+          <p:cNvPr id="2" name="Slide Image Placeholder 1"/>
+          <p:cNvSpPr>
+            <a:spLocks noGrp="1" noRot="1" noChangeAspect="1"/>
+          </p:cNvSpPr>
+          <p:nvPr>
+            <p:ph type="sldImg"/>
+          </p:nvPr>
+        </p:nvSpPr>
+        <p:spPr/>
+      </p:sp>
+      <p:sp>
+        <p:nvSpPr>
+          <p:cNvPr id="3" name="Notes Placeholder 2"/>
+          <p:cNvSpPr>
+            <a:spLocks noGrp="1"/>
+          </p:cNvSpPr>
+          <p:nvPr>
+            <p:ph type="body" idx="1"/>
+          </p:nvPr>
+        </p:nvSpPr>
+        <p:spPr/>
+        <p:txBody>
+          <a:bodyPr/>
+          <a:lstStyle/>
+          <a:p>
+            <a:r>
+              <a:rPr lang="en-US" dirty="0"/>
+              <a:t>In this deliverable I have extended the Exploratory Data Analysis that I did in last phase and tried to bring out some more insights from the data.</a:t>
+            </a:r>
+          </a:p>
+          <a:p>
+            <a:pPr marL="171450" indent="-171450">
+              <a:buFont typeface="Arial" panose="020B0604020202020204" pitchFamily="34" charset="0"/>
+              <a:buChar char="•"/>
+            </a:pPr>
+            <a:r>
+              <a:rPr lang="en-US" dirty="0"/>
+              <a:t>I was curious about on which day of the week are crimes mostly committed, so I have plotted this graph in which we can see that most of the crimes are committed on Friday even though the crimes are mostly even through out the week.</a:t>
+            </a:r>
+          </a:p>
+          <a:p>
+            <a:pPr marL="171450" indent="-171450">
+              <a:buFont typeface="Arial" panose="020B0604020202020204" pitchFamily="34" charset="0"/>
+              <a:buChar char="•"/>
+            </a:pPr>
+            <a:r>
+              <a:rPr lang="en-US" dirty="0"/>
+              <a:t>And the graph on right tells us about the Frequency of Crimes that are committed per each district in Chicago. So in district 8 most the crime frequency is very high, and it is very low in district number 20, 21 and 31. So according to this graph we can easily tell that district number 20,21 and 31 are the safer districts to stay in Chicago when compared to other districts</a:t>
+            </a:r>
+          </a:p>
+        </p:txBody>
+      </p:sp>
+      <p:sp>
+        <p:nvSpPr>
+          <p:cNvPr id="4" name="Slide Number Placeholder 3"/>
+          <p:cNvSpPr>
+            <a:spLocks noGrp="1"/>
+          </p:cNvSpPr>
+          <p:nvPr>
+            <p:ph type="sldNum" sz="quarter" idx="5"/>
+          </p:nvPr>
+        </p:nvSpPr>
+        <p:spPr/>
+        <p:txBody>
+          <a:bodyPr/>
+          <a:lstStyle/>
+          <a:p>
+            <a:fld id="{3E17C3BA-3197-4232-AB5E-8145A7D05623}" type="slidenum">
+              <a:rPr lang="en-US" smtClean="0"/>
+              <a:t>3</a:t>
+            </a:fld>
+            <a:endParaRPr lang="en-US"/>
+          </a:p>
+        </p:txBody>
+      </p:sp>
+    </p:spTree>
+    <p:extLst>
+      <p:ext uri="{BB962C8B-B14F-4D97-AF65-F5344CB8AC3E}">
+        <p14:creationId xmlns:p14="http://schemas.microsoft.com/office/powerpoint/2010/main" val="1938681804"/>
+      </p:ext>
+    </p:extLst>
+  </p:cSld>
+  <p:clrMapOvr>
+    <a:masterClrMapping/>
+  </p:clrMapOvr>
+</p:notes>
+</file>
+
+<file path=ppt/notesSlides/notesSlide4.xml><?xml version="1.0" encoding="utf-8"?>
+<p:notes xmlns:a="http://schemas.openxmlformats.org/drawingml/2006/main" xmlns:r="http://schemas.openxmlformats.org/officeDocument/2006/relationships" xmlns:p="http://schemas.openxmlformats.org/presentationml/2006/main">
+  <p:cSld>
+    <p:spTree>
+      <p:nvGrpSpPr>
+        <p:cNvPr id="1" name=""/>
+        <p:cNvGrpSpPr/>
+        <p:nvPr/>
+      </p:nvGrpSpPr>
+      <p:grpSpPr>
+        <a:xfrm>
+          <a:off x="0" y="0"/>
+          <a:ext cx="0" cy="0"/>
+          <a:chOff x="0" y="0"/>
+          <a:chExt cx="0" cy="0"/>
+        </a:xfrm>
+      </p:grpSpPr>
+      <p:sp>
+        <p:nvSpPr>
+          <p:cNvPr id="2" name="Slide Image Placeholder 1"/>
+          <p:cNvSpPr>
+            <a:spLocks noGrp="1" noRot="1" noChangeAspect="1"/>
+          </p:cNvSpPr>
+          <p:nvPr>
+            <p:ph type="sldImg"/>
+          </p:nvPr>
+        </p:nvSpPr>
+        <p:spPr/>
+      </p:sp>
+      <p:sp>
+        <p:nvSpPr>
+          <p:cNvPr id="3" name="Notes Placeholder 2"/>
+          <p:cNvSpPr>
+            <a:spLocks noGrp="1"/>
+          </p:cNvSpPr>
+          <p:nvPr>
+            <p:ph type="body" idx="1"/>
+          </p:nvPr>
+        </p:nvSpPr>
+        <p:spPr/>
+        <p:txBody>
+          <a:bodyPr/>
+          <a:lstStyle/>
+          <a:p>
+            <a:r>
+              <a:rPr lang="en-US" dirty="0"/>
+              <a:t>And I have plotted a couple of graphs on the sub crimes of the frequently committed crimes. </a:t>
+            </a:r>
+          </a:p>
+          <a:p>
+            <a:endParaRPr lang="en-US" dirty="0"/>
+          </a:p>
+          <a:p>
+            <a:r>
+              <a:rPr lang="en-US" dirty="0"/>
+              <a:t>Theft being the frequently committed crime in Chicago most of the thefts are less than are equal to 500$ and an interesting fact is Thefts from building are more in number than Retail thefts</a:t>
+            </a:r>
+          </a:p>
+          <a:p>
+            <a:endParaRPr lang="en-US" dirty="0"/>
+          </a:p>
+          <a:p>
+            <a:r>
+              <a:rPr lang="en-US" dirty="0"/>
+              <a:t>The bottom right graph tells us about frequently committed Assault crimes. Most of them are simple assault crimes and Some of them involve weapons like handgun and other sharp weapons like knife</a:t>
+            </a:r>
+          </a:p>
+        </p:txBody>
+      </p:sp>
+      <p:sp>
+        <p:nvSpPr>
+          <p:cNvPr id="4" name="Slide Number Placeholder 3"/>
+          <p:cNvSpPr>
+            <a:spLocks noGrp="1"/>
+          </p:cNvSpPr>
+          <p:nvPr>
+            <p:ph type="sldNum" sz="quarter" idx="5"/>
+          </p:nvPr>
+        </p:nvSpPr>
+        <p:spPr/>
+        <p:txBody>
+          <a:bodyPr/>
+          <a:lstStyle/>
+          <a:p>
+            <a:fld id="{3E17C3BA-3197-4232-AB5E-8145A7D05623}" type="slidenum">
+              <a:rPr lang="en-US" smtClean="0"/>
+              <a:t>4</a:t>
+            </a:fld>
+            <a:endParaRPr lang="en-US"/>
+          </a:p>
+        </p:txBody>
+      </p:sp>
+    </p:spTree>
+    <p:extLst>
+      <p:ext uri="{BB962C8B-B14F-4D97-AF65-F5344CB8AC3E}">
+        <p14:creationId xmlns:p14="http://schemas.microsoft.com/office/powerpoint/2010/main" val="201171660"/>
+      </p:ext>
+    </p:extLst>
+  </p:cSld>
+  <p:clrMapOvr>
+    <a:masterClrMapping/>
+  </p:clrMapOvr>
+</p:notes>
+</file>
+
+<file path=ppt/notesSlides/notesSlide5.xml><?xml version="1.0" encoding="utf-8"?>
+<p:notes xmlns:a="http://schemas.openxmlformats.org/drawingml/2006/main" xmlns:r="http://schemas.openxmlformats.org/officeDocument/2006/relationships" xmlns:p="http://schemas.openxmlformats.org/presentationml/2006/main">
+  <p:cSld>
+    <p:spTree>
+      <p:nvGrpSpPr>
+        <p:cNvPr id="1" name=""/>
+        <p:cNvGrpSpPr/>
+        <p:nvPr/>
+      </p:nvGrpSpPr>
+      <p:grpSpPr>
+        <a:xfrm>
+          <a:off x="0" y="0"/>
+          <a:ext cx="0" cy="0"/>
+          <a:chOff x="0" y="0"/>
+          <a:chExt cx="0" cy="0"/>
+        </a:xfrm>
+      </p:grpSpPr>
+      <p:sp>
+        <p:nvSpPr>
+          <p:cNvPr id="2" name="Slide Image Placeholder 1"/>
+          <p:cNvSpPr>
+            <a:spLocks noGrp="1" noRot="1" noChangeAspect="1"/>
+          </p:cNvSpPr>
+          <p:nvPr>
+            <p:ph type="sldImg"/>
+          </p:nvPr>
+        </p:nvSpPr>
+        <p:spPr/>
+      </p:sp>
+      <p:sp>
+        <p:nvSpPr>
+          <p:cNvPr id="3" name="Notes Placeholder 2"/>
+          <p:cNvSpPr>
+            <a:spLocks noGrp="1"/>
+          </p:cNvSpPr>
+          <p:nvPr>
+            <p:ph type="body" idx="1"/>
+          </p:nvPr>
+        </p:nvSpPr>
+        <p:spPr/>
+        <p:txBody>
+          <a:bodyPr/>
+          <a:lstStyle/>
+          <a:p>
+            <a:pPr marL="171450" indent="-171450">
+              <a:buFont typeface="Arial" panose="020B0604020202020204" pitchFamily="34" charset="0"/>
+              <a:buChar char="•"/>
+            </a:pPr>
+            <a:r>
+              <a:rPr lang="en-US" dirty="0"/>
+              <a:t>Based on the longitudinal and latitudinal data in this data set I tried plotting those points on a map using a package called folium and it came out like this</a:t>
+            </a:r>
+          </a:p>
+          <a:p>
+            <a:pPr marL="171450" indent="-171450">
+              <a:buFont typeface="Arial" panose="020B0604020202020204" pitchFamily="34" charset="0"/>
+              <a:buChar char="•"/>
+            </a:pPr>
+            <a:r>
+              <a:rPr lang="en-US" dirty="0"/>
+              <a:t>In this picture all the blue circles are crime locations in Chicago city. It is interactive in the notebook where you can zoom in and zoom out. If you are really interested in seeing all the crime spots please check out my notebook through my </a:t>
+            </a:r>
+            <a:r>
+              <a:rPr lang="en-US" dirty="0" err="1"/>
+              <a:t>github</a:t>
+            </a:r>
+            <a:r>
+              <a:rPr lang="en-US" dirty="0"/>
+              <a:t> link posted in the discussion posting.</a:t>
+            </a:r>
+          </a:p>
+        </p:txBody>
+      </p:sp>
+      <p:sp>
+        <p:nvSpPr>
+          <p:cNvPr id="4" name="Slide Number Placeholder 3"/>
+          <p:cNvSpPr>
+            <a:spLocks noGrp="1"/>
+          </p:cNvSpPr>
+          <p:nvPr>
+            <p:ph type="sldNum" sz="quarter" idx="5"/>
+          </p:nvPr>
+        </p:nvSpPr>
+        <p:spPr/>
+        <p:txBody>
+          <a:bodyPr/>
+          <a:lstStyle/>
+          <a:p>
+            <a:fld id="{3E17C3BA-3197-4232-AB5E-8145A7D05623}" type="slidenum">
+              <a:rPr lang="en-US" smtClean="0"/>
+              <a:t>5</a:t>
+            </a:fld>
+            <a:endParaRPr lang="en-US"/>
+          </a:p>
+        </p:txBody>
+      </p:sp>
+    </p:spTree>
+    <p:extLst>
+      <p:ext uri="{BB962C8B-B14F-4D97-AF65-F5344CB8AC3E}">
+        <p14:creationId xmlns:p14="http://schemas.microsoft.com/office/powerpoint/2010/main" val="1456948253"/>
+      </p:ext>
+    </p:extLst>
+  </p:cSld>
+  <p:clrMapOvr>
+    <a:masterClrMapping/>
+  </p:clrMapOvr>
+</p:notes>
+</file>
+
+<file path=ppt/notesSlides/notesSlide6.xml><?xml version="1.0" encoding="utf-8"?>
+<p:notes xmlns:a="http://schemas.openxmlformats.org/drawingml/2006/main" xmlns:r="http://schemas.openxmlformats.org/officeDocument/2006/relationships" xmlns:p="http://schemas.openxmlformats.org/presentationml/2006/main">
+  <p:cSld>
+    <p:spTree>
+      <p:nvGrpSpPr>
+        <p:cNvPr id="1" name=""/>
+        <p:cNvGrpSpPr/>
+        <p:nvPr/>
+      </p:nvGrpSpPr>
+      <p:grpSpPr>
+        <a:xfrm>
+          <a:off x="0" y="0"/>
+          <a:ext cx="0" cy="0"/>
+          <a:chOff x="0" y="0"/>
+          <a:chExt cx="0" cy="0"/>
+        </a:xfrm>
+      </p:grpSpPr>
+      <p:sp>
+        <p:nvSpPr>
+          <p:cNvPr id="2" name="Slide Image Placeholder 1"/>
+          <p:cNvSpPr>
+            <a:spLocks noGrp="1" noRot="1" noChangeAspect="1"/>
+          </p:cNvSpPr>
+          <p:nvPr>
+            <p:ph type="sldImg"/>
+          </p:nvPr>
+        </p:nvSpPr>
+        <p:spPr/>
+      </p:sp>
+      <p:sp>
+        <p:nvSpPr>
+          <p:cNvPr id="3" name="Notes Placeholder 2"/>
+          <p:cNvSpPr>
+            <a:spLocks noGrp="1"/>
+          </p:cNvSpPr>
+          <p:nvPr>
+            <p:ph type="body" idx="1"/>
+          </p:nvPr>
+        </p:nvSpPr>
+        <p:spPr/>
+        <p:txBody>
+          <a:bodyPr/>
+          <a:lstStyle/>
+          <a:p>
+            <a:r>
+              <a:rPr lang="en-US" dirty="0"/>
+              <a:t>Coming to the Modelling part, In this deliverable I followed this workflow in which I first cleaned the data and then check if there are any inconsistencies.</a:t>
+            </a:r>
+          </a:p>
+          <a:p>
+            <a:r>
+              <a:rPr lang="en-US" dirty="0"/>
+              <a:t>And I chose Arrest column as my target variable to start with modelling, but I am going to take primary type of the crime as my target in my next phase of the project.</a:t>
+            </a:r>
+          </a:p>
+          <a:p>
+            <a:r>
+              <a:rPr lang="en-US" dirty="0"/>
+              <a:t>After that I have split the data into training data and testing data. But it looked like there is some need for data wrangling to start fitting the data into different models which is nothing but converting the data from raw form to required form. In my case I did it for converting the format of date and time.</a:t>
+            </a:r>
+          </a:p>
+          <a:p>
+            <a:r>
+              <a:rPr lang="en-US" dirty="0"/>
+              <a:t>Finally I tried using three different models to predict the target variable which is a bivariant variable.</a:t>
+            </a:r>
+          </a:p>
+        </p:txBody>
+      </p:sp>
+      <p:sp>
+        <p:nvSpPr>
+          <p:cNvPr id="4" name="Slide Number Placeholder 3"/>
+          <p:cNvSpPr>
+            <a:spLocks noGrp="1"/>
+          </p:cNvSpPr>
+          <p:nvPr>
+            <p:ph type="sldNum" sz="quarter" idx="5"/>
+          </p:nvPr>
+        </p:nvSpPr>
+        <p:spPr/>
+        <p:txBody>
+          <a:bodyPr/>
+          <a:lstStyle/>
+          <a:p>
+            <a:fld id="{3E17C3BA-3197-4232-AB5E-8145A7D05623}" type="slidenum">
+              <a:rPr lang="en-US" smtClean="0"/>
+              <a:t>6</a:t>
+            </a:fld>
+            <a:endParaRPr lang="en-US"/>
+          </a:p>
+        </p:txBody>
+      </p:sp>
+    </p:spTree>
+    <p:extLst>
+      <p:ext uri="{BB962C8B-B14F-4D97-AF65-F5344CB8AC3E}">
+        <p14:creationId xmlns:p14="http://schemas.microsoft.com/office/powerpoint/2010/main" val="3093776818"/>
+      </p:ext>
+    </p:extLst>
+  </p:cSld>
+  <p:clrMapOvr>
+    <a:masterClrMapping/>
+  </p:clrMapOvr>
+</p:notes>
+</file>
+
+<file path=ppt/notesSlides/notesSlide7.xml><?xml version="1.0" encoding="utf-8"?>
+<p:notes xmlns:a="http://schemas.openxmlformats.org/drawingml/2006/main" xmlns:r="http://schemas.openxmlformats.org/officeDocument/2006/relationships" xmlns:p="http://schemas.openxmlformats.org/presentationml/2006/main">
+  <p:cSld>
+    <p:spTree>
+      <p:nvGrpSpPr>
+        <p:cNvPr id="1" name=""/>
+        <p:cNvGrpSpPr/>
+        <p:nvPr/>
+      </p:nvGrpSpPr>
+      <p:grpSpPr>
+        <a:xfrm>
+          <a:off x="0" y="0"/>
+          <a:ext cx="0" cy="0"/>
+          <a:chOff x="0" y="0"/>
+          <a:chExt cx="0" cy="0"/>
+        </a:xfrm>
+      </p:grpSpPr>
+      <p:sp>
+        <p:nvSpPr>
+          <p:cNvPr id="2" name="Slide Image Placeholder 1"/>
+          <p:cNvSpPr>
+            <a:spLocks noGrp="1" noRot="1" noChangeAspect="1"/>
+          </p:cNvSpPr>
+          <p:nvPr>
+            <p:ph type="sldImg"/>
+          </p:nvPr>
+        </p:nvSpPr>
+        <p:spPr/>
+      </p:sp>
+      <p:sp>
+        <p:nvSpPr>
+          <p:cNvPr id="3" name="Notes Placeholder 2"/>
+          <p:cNvSpPr>
+            <a:spLocks noGrp="1"/>
+          </p:cNvSpPr>
+          <p:nvPr>
+            <p:ph type="body" idx="1"/>
+          </p:nvPr>
+        </p:nvSpPr>
+        <p:spPr/>
+        <p:txBody>
+          <a:bodyPr/>
+          <a:lstStyle/>
+          <a:p>
+            <a:r>
+              <a:rPr lang="en-US" dirty="0"/>
+              <a:t>The results were like this:</a:t>
+            </a:r>
+          </a:p>
+          <a:p>
+            <a:pPr marL="171450" indent="-171450">
+              <a:buFont typeface="Arial" panose="020B0604020202020204" pitchFamily="34" charset="0"/>
+              <a:buChar char="•"/>
+            </a:pPr>
+            <a:r>
+              <a:rPr lang="en-US" dirty="0"/>
+              <a:t>I used Logistic regression, </a:t>
+            </a:r>
+            <a:r>
+              <a:rPr lang="en-US" dirty="0" err="1"/>
+              <a:t>XGBoost</a:t>
+            </a:r>
+            <a:r>
+              <a:rPr lang="en-US" dirty="0"/>
+              <a:t> Classifier and </a:t>
+            </a:r>
+            <a:r>
+              <a:rPr lang="en-US" dirty="0" err="1"/>
+              <a:t>RandomforestClassifier</a:t>
+            </a:r>
+            <a:r>
+              <a:rPr lang="en-US" dirty="0"/>
+              <a:t> out of which Random forest did a good job performing well with an accuracy of 88.9 % . Logistic Regression gave an accuracy of 72 % and </a:t>
+            </a:r>
+            <a:r>
+              <a:rPr lang="en-US" dirty="0" err="1"/>
+              <a:t>XGBoost</a:t>
+            </a:r>
+            <a:r>
+              <a:rPr lang="en-US" dirty="0"/>
+              <a:t> was almost at par with </a:t>
+            </a:r>
+            <a:r>
+              <a:rPr lang="en-US" dirty="0" err="1"/>
+              <a:t>RnadomForest</a:t>
+            </a:r>
+            <a:r>
+              <a:rPr lang="en-US" dirty="0"/>
+              <a:t> classifier with 87.2% accuracy</a:t>
+            </a:r>
+          </a:p>
+        </p:txBody>
+      </p:sp>
+      <p:sp>
+        <p:nvSpPr>
+          <p:cNvPr id="4" name="Slide Number Placeholder 3"/>
+          <p:cNvSpPr>
+            <a:spLocks noGrp="1"/>
+          </p:cNvSpPr>
+          <p:nvPr>
+            <p:ph type="sldNum" sz="quarter" idx="5"/>
+          </p:nvPr>
+        </p:nvSpPr>
+        <p:spPr/>
+        <p:txBody>
+          <a:bodyPr/>
+          <a:lstStyle/>
+          <a:p>
+            <a:fld id="{3E17C3BA-3197-4232-AB5E-8145A7D05623}" type="slidenum">
+              <a:rPr lang="en-US" smtClean="0"/>
+              <a:t>7</a:t>
+            </a:fld>
+            <a:endParaRPr lang="en-US"/>
+          </a:p>
+        </p:txBody>
+      </p:sp>
+    </p:spTree>
+    <p:extLst>
+      <p:ext uri="{BB962C8B-B14F-4D97-AF65-F5344CB8AC3E}">
+        <p14:creationId xmlns:p14="http://schemas.microsoft.com/office/powerpoint/2010/main" val="27168897"/>
+      </p:ext>
+    </p:extLst>
+  </p:cSld>
+  <p:clrMapOvr>
+    <a:masterClrMapping/>
+  </p:clrMapOvr>
+</p:notes>
+</file>
+
+<file path=ppt/notesSlides/notesSlide8.xml><?xml version="1.0" encoding="utf-8"?>
+<p:notes xmlns:a="http://schemas.openxmlformats.org/drawingml/2006/main" xmlns:r="http://schemas.openxmlformats.org/officeDocument/2006/relationships" xmlns:p="http://schemas.openxmlformats.org/presentationml/2006/main">
+  <p:cSld>
+    <p:spTree>
+      <p:nvGrpSpPr>
+        <p:cNvPr id="1" name=""/>
+        <p:cNvGrpSpPr/>
+        <p:nvPr/>
+      </p:nvGrpSpPr>
+      <p:grpSpPr>
+        <a:xfrm>
+          <a:off x="0" y="0"/>
+          <a:ext cx="0" cy="0"/>
+          <a:chOff x="0" y="0"/>
+          <a:chExt cx="0" cy="0"/>
+        </a:xfrm>
+      </p:grpSpPr>
+      <p:sp>
+        <p:nvSpPr>
+          <p:cNvPr id="2" name="Slide Image Placeholder 1"/>
+          <p:cNvSpPr>
+            <a:spLocks noGrp="1" noRot="1" noChangeAspect="1"/>
+          </p:cNvSpPr>
+          <p:nvPr>
+            <p:ph type="sldImg"/>
+          </p:nvPr>
+        </p:nvSpPr>
+        <p:spPr/>
+      </p:sp>
+      <p:sp>
+        <p:nvSpPr>
+          <p:cNvPr id="3" name="Notes Placeholder 2"/>
+          <p:cNvSpPr>
+            <a:spLocks noGrp="1"/>
+          </p:cNvSpPr>
+          <p:nvPr>
+            <p:ph type="body" idx="1"/>
+          </p:nvPr>
+        </p:nvSpPr>
+        <p:spPr/>
+        <p:txBody>
+          <a:bodyPr/>
+          <a:lstStyle/>
+          <a:p>
+            <a:r>
+              <a:rPr lang="en-US" dirty="0"/>
+              <a:t>I know that I am in the initial stages of the project. I am thinking to use multiclass multilabel classification algorithms to predict The primary type and location of the crime in my next phase of the project. And, I would like to experiment with several other suitable algorithms and finally evaluate the performances to find the best fit model for this data.</a:t>
+            </a:r>
+          </a:p>
+          <a:p>
+            <a:endParaRPr lang="en-US" dirty="0"/>
+          </a:p>
+        </p:txBody>
+      </p:sp>
+      <p:sp>
+        <p:nvSpPr>
+          <p:cNvPr id="4" name="Slide Number Placeholder 3"/>
+          <p:cNvSpPr>
+            <a:spLocks noGrp="1"/>
+          </p:cNvSpPr>
+          <p:nvPr>
+            <p:ph type="sldNum" sz="quarter" idx="5"/>
+          </p:nvPr>
+        </p:nvSpPr>
+        <p:spPr/>
+        <p:txBody>
+          <a:bodyPr/>
+          <a:lstStyle/>
+          <a:p>
+            <a:fld id="{3E17C3BA-3197-4232-AB5E-8145A7D05623}" type="slidenum">
+              <a:rPr lang="en-US" smtClean="0"/>
+              <a:t>8</a:t>
+            </a:fld>
+            <a:endParaRPr lang="en-US"/>
+          </a:p>
+        </p:txBody>
+      </p:sp>
+    </p:spTree>
+    <p:extLst>
+      <p:ext uri="{BB962C8B-B14F-4D97-AF65-F5344CB8AC3E}">
+        <p14:creationId xmlns:p14="http://schemas.microsoft.com/office/powerpoint/2010/main" val="4039113753"/>
+      </p:ext>
+    </p:extLst>
+  </p:cSld>
+  <p:clrMapOvr>
+    <a:masterClrMapping/>
+  </p:clrMapOvr>
+</p:notes>
+</file>
+
+<file path=ppt/notesSlides/notesSlide9.xml><?xml version="1.0" encoding="utf-8"?>
+<p:notes xmlns:a="http://schemas.openxmlformats.org/drawingml/2006/main" xmlns:r="http://schemas.openxmlformats.org/officeDocument/2006/relationships" xmlns:p="http://schemas.openxmlformats.org/presentationml/2006/main">
+  <p:cSld>
+    <p:spTree>
+      <p:nvGrpSpPr>
+        <p:cNvPr id="1" name=""/>
+        <p:cNvGrpSpPr/>
+        <p:nvPr/>
+      </p:nvGrpSpPr>
+      <p:grpSpPr>
+        <a:xfrm>
+          <a:off x="0" y="0"/>
+          <a:ext cx="0" cy="0"/>
+          <a:chOff x="0" y="0"/>
+          <a:chExt cx="0" cy="0"/>
+        </a:xfrm>
+      </p:grpSpPr>
+      <p:sp>
+        <p:nvSpPr>
+          <p:cNvPr id="2" name="Slide Image Placeholder 1"/>
+          <p:cNvSpPr>
+            <a:spLocks noGrp="1" noRot="1" noChangeAspect="1"/>
+          </p:cNvSpPr>
+          <p:nvPr>
+            <p:ph type="sldImg"/>
+          </p:nvPr>
+        </p:nvSpPr>
+        <p:spPr/>
+      </p:sp>
+      <p:sp>
+        <p:nvSpPr>
+          <p:cNvPr id="3" name="Notes Placeholder 2"/>
+          <p:cNvSpPr>
+            <a:spLocks noGrp="1"/>
+          </p:cNvSpPr>
+          <p:nvPr>
+            <p:ph type="body" idx="1"/>
+          </p:nvPr>
+        </p:nvSpPr>
+        <p:spPr/>
+        <p:txBody>
+          <a:bodyPr/>
+          <a:lstStyle/>
+          <a:p>
+            <a:r>
+              <a:rPr lang="en-US" dirty="0"/>
+              <a:t>Thank you everyone</a:t>
+            </a:r>
+          </a:p>
+          <a:p>
+            <a:r>
+              <a:rPr lang="en-US" dirty="0"/>
+              <a:t>If you have any doubts please reach out to me at ym53858@umbc.edu</a:t>
+            </a:r>
+          </a:p>
+        </p:txBody>
+      </p:sp>
+      <p:sp>
+        <p:nvSpPr>
+          <p:cNvPr id="4" name="Slide Number Placeholder 3"/>
+          <p:cNvSpPr>
+            <a:spLocks noGrp="1"/>
+          </p:cNvSpPr>
+          <p:nvPr>
+            <p:ph type="sldNum" sz="quarter" idx="5"/>
+          </p:nvPr>
+        </p:nvSpPr>
+        <p:spPr/>
+        <p:txBody>
+          <a:bodyPr/>
+          <a:lstStyle/>
+          <a:p>
+            <a:fld id="{3E17C3BA-3197-4232-AB5E-8145A7D05623}" type="slidenum">
+              <a:rPr lang="en-US" smtClean="0"/>
+              <a:t>9</a:t>
+            </a:fld>
+            <a:endParaRPr lang="en-US"/>
+          </a:p>
+        </p:txBody>
+      </p:sp>
+    </p:spTree>
+    <p:extLst>
+      <p:ext uri="{BB962C8B-B14F-4D97-AF65-F5344CB8AC3E}">
+        <p14:creationId xmlns:p14="http://schemas.microsoft.com/office/powerpoint/2010/main" val="3406646659"/>
+      </p:ext>
+    </p:extLst>
+  </p:cSld>
+  <p:clrMapOvr>
+    <a:masterClrMapping/>
+  </p:clrMapOvr>
+</p:notes>
+</file>
+
 <file path=ppt/slideLayouts/slideLayout1.xml><?xml version="1.0" encoding="utf-8"?>
 <p:sldLayout xmlns:a="http://schemas.openxmlformats.org/drawingml/2006/main" xmlns:r="http://schemas.openxmlformats.org/officeDocument/2006/relationships" xmlns:p="http://schemas.openxmlformats.org/presentationml/2006/main" type="title" preserve="1">
   <p:cSld name="Title Slide">
@@ -10412,7 +11681,7 @@
           <p:nvPr/>
         </p:nvPicPr>
         <p:blipFill rotWithShape="1">
-          <a:blip r:embed="rId2">
+          <a:blip r:embed="rId3">
             <a:extLst>
               <a:ext uri="{28A0092B-C50C-407E-A947-70E740481C1C}">
                 <a14:useLocalDpi xmlns:a14="http://schemas.microsoft.com/office/drawing/2010/main" val="0"/>
@@ -11017,7 +12286,7 @@
         </p:xfrm>
         <a:graphic>
           <a:graphicData uri="http://schemas.openxmlformats.org/drawingml/2006/diagram">
-            <dgm:relIds xmlns:dgm="http://schemas.openxmlformats.org/drawingml/2006/diagram" xmlns:r="http://schemas.openxmlformats.org/officeDocument/2006/relationships" r:dm="rId2" r:lo="rId3" r:qs="rId4" r:cs="rId5"/>
+            <dgm:relIds xmlns:dgm="http://schemas.openxmlformats.org/drawingml/2006/diagram" xmlns:r="http://schemas.openxmlformats.org/officeDocument/2006/relationships" r:dm="rId3" r:lo="rId4" r:qs="rId5" r:cs="rId6"/>
           </a:graphicData>
         </a:graphic>
       </p:graphicFrame>
@@ -11231,7 +12500,7 @@
           <p:nvPr/>
         </p:nvPicPr>
         <p:blipFill>
-          <a:blip r:embed="rId2"/>
+          <a:blip r:embed="rId3"/>
           <a:stretch>
             <a:fillRect/>
           </a:stretch>
@@ -11315,7 +12584,7 @@
           </p:nvPr>
         </p:nvPicPr>
         <p:blipFill>
-          <a:blip r:embed="rId3">
+          <a:blip r:embed="rId4">
             <a:extLst>
               <a:ext uri="{28A0092B-C50C-407E-A947-70E740481C1C}">
                 <a14:useLocalDpi xmlns:a14="http://schemas.microsoft.com/office/drawing/2010/main" val="0"/>
@@ -11384,12 +12653,12 @@
           <a:chExt cx="0" cy="0"/>
         </a:xfrm>
       </p:grpSpPr>
-      <p:sp>
+      <p:sp useBgFill="1">
         <p:nvSpPr>
-          <p:cNvPr id="73" name="Rectangle 72">
+          <p:cNvPr id="139" name="Rectangle 138">
             <a:extLst>
               <a:ext uri="{FF2B5EF4-FFF2-40B4-BE49-F238E27FC236}">
-                <a16:creationId xmlns:a16="http://schemas.microsoft.com/office/drawing/2014/main" id="{823AC064-BC96-4F32-8AE1-B2FD38754823}"/>
+                <a16:creationId xmlns:a16="http://schemas.microsoft.com/office/drawing/2014/main" id="{7316481C-0A49-4796-812B-0D64F063B720}"/>
               </a:ext>
               <a:ext uri="{C183D7F6-B498-43B3-948B-1728B52AA6E4}">
                 <adec:decorative xmlns:adec="http://schemas.microsoft.com/office/drawing/2017/decorative" val="1"/>
@@ -11407,21 +12676,16 @@
             </p:extLst>
           </p:nvPr>
         </p:nvSpPr>
-        <p:spPr bwMode="ltGray">
+        <p:spPr>
           <a:xfrm>
-            <a:off x="396882" y="280374"/>
-            <a:ext cx="11438793" cy="1844256"/>
+            <a:off x="0" y="0"/>
+            <a:ext cx="12192000" cy="6858000"/>
           </a:xfrm>
           <a:prstGeom prst="rect">
             <a:avLst/>
           </a:prstGeom>
-          <a:solidFill>
-            <a:srgbClr val="404040"/>
-          </a:solidFill>
-          <a:ln w="127000" cap="sq" cmpd="thinThick">
-            <a:solidFill>
-              <a:srgbClr val="404040"/>
-            </a:solidFill>
+          <a:ln>
+            <a:noFill/>
           </a:ln>
         </p:spPr>
         <p:style>
@@ -11467,8 +12731,8 @@
         </p:nvSpPr>
         <p:spPr>
           <a:xfrm>
-            <a:off x="546351" y="433545"/>
-            <a:ext cx="11139854" cy="930447"/>
+            <a:off x="1116498" y="655128"/>
+            <a:ext cx="4613919" cy="1499616"/>
           </a:xfrm>
         </p:spPr>
         <p:txBody>
@@ -11477,33 +12741,28 @@
           </a:bodyPr>
           <a:lstStyle/>
           <a:p>
-            <a:pPr algn="ctr"/>
             <a:r>
-              <a:rPr lang="en-US" sz="5400" dirty="0">
-                <a:solidFill>
-                  <a:srgbClr val="FFFFFF"/>
-                </a:solidFill>
-              </a:rPr>
+              <a:rPr lang="en-US" sz="4200"/>
               <a:t>EDA</a:t>
             </a:r>
           </a:p>
         </p:txBody>
       </p:sp>
-      <p:cxnSp>
-        <p:nvCxnSpPr>
-          <p:cNvPr id="75" name="Straight Connector 74">
+      <p:sp>
+        <p:nvSpPr>
+          <p:cNvPr id="141" name="Rectangle 140">
             <a:extLst>
               <a:ext uri="{FF2B5EF4-FFF2-40B4-BE49-F238E27FC236}">
-                <a16:creationId xmlns:a16="http://schemas.microsoft.com/office/drawing/2014/main" id="{7E7C77BC-7138-40B1-A15B-20F57A494629}"/>
+                <a16:creationId xmlns:a16="http://schemas.microsoft.com/office/drawing/2014/main" id="{A5271697-90F1-4A23-8EF2-0179F2EAFACB}"/>
               </a:ext>
               <a:ext uri="{C183D7F6-B498-43B3-948B-1728B52AA6E4}">
                 <adec:decorative xmlns:adec="http://schemas.microsoft.com/office/drawing/2017/decorative" val="1"/>
               </a:ext>
             </a:extLst>
           </p:cNvPr>
-          <p:cNvCxnSpPr>
-            <a:cxnSpLocks noGrp="1" noRot="1" noChangeAspect="1" noMove="1" noResize="1" noEditPoints="1" noAdjustHandles="1" noChangeArrowheads="1" noChangeShapeType="1"/>
-          </p:cNvCxnSpPr>
+          <p:cNvSpPr>
+            <a:spLocks noGrp="1" noRot="1" noChangeAspect="1" noMove="1" noResize="1" noEditPoints="1" noAdjustHandles="1" noChangeArrowheads="1" noChangeShapeType="1" noTextEdit="1"/>
+          </p:cNvSpPr>
           <p:nvPr>
             <p:extLst>
               <p:ext uri="{386F3935-93C4-4BCD-93E2-E3B085C9AB24}">
@@ -11511,68 +12770,1331 @@
               </p:ext>
             </p:extLst>
           </p:nvPr>
-        </p:nvCxnSpPr>
+        </p:nvSpPr>
         <p:spPr>
           <a:xfrm>
-            <a:off x="2230078" y="1522292"/>
-            <a:ext cx="7772400" cy="0"/>
+            <a:off x="-1" y="1"/>
+            <a:ext cx="606972" cy="3233984"/>
           </a:xfrm>
-          <a:prstGeom prst="line">
+          <a:prstGeom prst="rect">
             <a:avLst/>
           </a:prstGeom>
-          <a:ln w="22225">
-            <a:solidFill>
-              <a:srgbClr val="D9D9D9"/>
-            </a:solidFill>
+          <a:solidFill>
+            <a:schemeClr val="tx1">
+              <a:lumMod val="85000"/>
+              <a:lumOff val="15000"/>
+            </a:schemeClr>
+          </a:solidFill>
+          <a:ln>
+            <a:noFill/>
           </a:ln>
         </p:spPr>
         <p:style>
-          <a:lnRef idx="1">
-            <a:schemeClr val="accent1"/>
+          <a:lnRef idx="2">
+            <a:schemeClr val="accent1">
+              <a:shade val="50000"/>
+            </a:schemeClr>
           </a:lnRef>
-          <a:fillRef idx="0">
+          <a:fillRef idx="1">
             <a:schemeClr val="accent1"/>
           </a:fillRef>
           <a:effectRef idx="0">
             <a:schemeClr val="accent1"/>
           </a:effectRef>
           <a:fontRef idx="minor">
-            <a:schemeClr val="tx1"/>
+            <a:schemeClr val="lt1"/>
           </a:fontRef>
         </p:style>
-      </p:cxnSp>
+        <p:txBody>
+          <a:bodyPr rtlCol="0" anchor="ctr"/>
+          <a:lstStyle/>
+          <a:p>
+            <a:pPr algn="ctr"/>
+            <a:endParaRPr lang="en-US"/>
+          </a:p>
+        </p:txBody>
+      </p:sp>
+      <p:grpSp>
+        <p:nvGrpSpPr>
+          <p:cNvPr id="143" name="Group 142">
+            <a:extLst>
+              <a:ext uri="{FF2B5EF4-FFF2-40B4-BE49-F238E27FC236}">
+                <a16:creationId xmlns:a16="http://schemas.microsoft.com/office/drawing/2014/main" id="{1F49CE81-B2F4-47B2-9D4A-886DCE0A8404}"/>
+              </a:ext>
+              <a:ext uri="{C183D7F6-B498-43B3-948B-1728B52AA6E4}">
+                <adec:decorative xmlns:adec="http://schemas.microsoft.com/office/drawing/2017/decorative" val="1"/>
+              </a:ext>
+            </a:extLst>
+          </p:cNvPr>
+          <p:cNvGrpSpPr>
+            <a:grpSpLocks noGrp="1" noUngrp="1" noRot="1" noChangeAspect="1" noMove="1" noResize="1"/>
+          </p:cNvGrpSpPr>
+          <p:nvPr>
+            <p:extLst>
+              <p:ext uri="{386F3935-93C4-4BCD-93E2-E3B085C9AB24}">
+                <p16:designElem xmlns:p16="http://schemas.microsoft.com/office/powerpoint/2015/main" val="1"/>
+              </p:ext>
+            </p:extLst>
+          </p:nvPr>
+        </p:nvGrpSpPr>
+        <p:grpSpPr>
+          <a:xfrm>
+            <a:off x="1188720" y="73152"/>
+            <a:ext cx="1178966" cy="232963"/>
+            <a:chOff x="7763256" y="73152"/>
+            <a:chExt cx="1178966" cy="232963"/>
+          </a:xfrm>
+        </p:grpSpPr>
+        <p:sp>
+          <p:nvSpPr>
+            <p:cNvPr id="144" name="Rectangle 64">
+              <a:extLst>
+                <a:ext uri="{FF2B5EF4-FFF2-40B4-BE49-F238E27FC236}">
+                  <a16:creationId xmlns:a16="http://schemas.microsoft.com/office/drawing/2014/main" id="{4BE32177-3EAD-42DA-997C-8DAE1BFEE58F}"/>
+                </a:ext>
+                <a:ext uri="{C183D7F6-B498-43B3-948B-1728B52AA6E4}">
+                  <adec:decorative xmlns:adec="http://schemas.microsoft.com/office/drawing/2017/decorative" val="1"/>
+                </a:ext>
+              </a:extLst>
+            </p:cNvPr>
+            <p:cNvSpPr/>
+            <p:nvPr>
+              <p:extLst>
+                <p:ext uri="{386F3935-93C4-4BCD-93E2-E3B085C9AB24}">
+                  <p16:designElem xmlns:p16="http://schemas.microsoft.com/office/powerpoint/2015/main" val="1"/>
+                </p:ext>
+              </p:extLst>
+            </p:nvPr>
+          </p:nvSpPr>
+          <p:spPr>
+            <a:xfrm>
+              <a:off x="8263077" y="73152"/>
+              <a:ext cx="54368" cy="59227"/>
+            </a:xfrm>
+            <a:prstGeom prst="ellipse">
+              <a:avLst/>
+            </a:prstGeom>
+            <a:solidFill>
+              <a:schemeClr val="accent1"/>
+            </a:solidFill>
+            <a:ln>
+              <a:noFill/>
+            </a:ln>
+          </p:spPr>
+          <p:style>
+            <a:lnRef idx="2">
+              <a:schemeClr val="accent1">
+                <a:shade val="50000"/>
+              </a:schemeClr>
+            </a:lnRef>
+            <a:fillRef idx="1">
+              <a:schemeClr val="accent1"/>
+            </a:fillRef>
+            <a:effectRef idx="0">
+              <a:schemeClr val="accent1"/>
+            </a:effectRef>
+            <a:fontRef idx="minor">
+              <a:schemeClr val="lt1"/>
+            </a:fontRef>
+          </p:style>
+          <p:txBody>
+            <a:bodyPr rtlCol="0" anchor="ctr"/>
+            <a:lstStyle/>
+            <a:p>
+              <a:pPr algn="ctr"/>
+              <a:endParaRPr lang="en-US"/>
+            </a:p>
+          </p:txBody>
+        </p:sp>
+        <p:sp>
+          <p:nvSpPr>
+            <p:cNvPr id="145" name="Rectangle 66">
+              <a:extLst>
+                <a:ext uri="{FF2B5EF4-FFF2-40B4-BE49-F238E27FC236}">
+                  <a16:creationId xmlns:a16="http://schemas.microsoft.com/office/drawing/2014/main" id="{A0DEE160-9825-4DB5-8188-911AC13EA761}"/>
+                </a:ext>
+                <a:ext uri="{C183D7F6-B498-43B3-948B-1728B52AA6E4}">
+                  <adec:decorative xmlns:adec="http://schemas.microsoft.com/office/drawing/2017/decorative" val="1"/>
+                </a:ext>
+              </a:extLst>
+            </p:cNvPr>
+            <p:cNvSpPr/>
+            <p:nvPr>
+              <p:extLst>
+                <p:ext uri="{386F3935-93C4-4BCD-93E2-E3B085C9AB24}">
+                  <p16:designElem xmlns:p16="http://schemas.microsoft.com/office/powerpoint/2015/main" val="1"/>
+                </p:ext>
+              </p:extLst>
+            </p:nvPr>
+          </p:nvSpPr>
+          <p:spPr>
+            <a:xfrm>
+              <a:off x="8263077" y="246888"/>
+              <a:ext cx="54368" cy="59227"/>
+            </a:xfrm>
+            <a:prstGeom prst="ellipse">
+              <a:avLst/>
+            </a:prstGeom>
+            <a:solidFill>
+              <a:schemeClr val="accent1"/>
+            </a:solidFill>
+            <a:ln>
+              <a:noFill/>
+            </a:ln>
+          </p:spPr>
+          <p:style>
+            <a:lnRef idx="2">
+              <a:schemeClr val="accent1">
+                <a:shade val="50000"/>
+              </a:schemeClr>
+            </a:lnRef>
+            <a:fillRef idx="1">
+              <a:schemeClr val="accent1"/>
+            </a:fillRef>
+            <a:effectRef idx="0">
+              <a:schemeClr val="accent1"/>
+            </a:effectRef>
+            <a:fontRef idx="minor">
+              <a:schemeClr val="lt1"/>
+            </a:fontRef>
+          </p:style>
+          <p:txBody>
+            <a:bodyPr rtlCol="0" anchor="ctr"/>
+            <a:lstStyle/>
+            <a:p>
+              <a:pPr algn="ctr"/>
+              <a:endParaRPr lang="en-US"/>
+            </a:p>
+          </p:txBody>
+        </p:sp>
+        <p:sp>
+          <p:nvSpPr>
+            <p:cNvPr id="146" name="Rectangle 64">
+              <a:extLst>
+                <a:ext uri="{FF2B5EF4-FFF2-40B4-BE49-F238E27FC236}">
+                  <a16:creationId xmlns:a16="http://schemas.microsoft.com/office/drawing/2014/main" id="{9C5FEDB5-0AEE-40E4-9CA6-6718B956D932}"/>
+                </a:ext>
+                <a:ext uri="{C183D7F6-B498-43B3-948B-1728B52AA6E4}">
+                  <adec:decorative xmlns:adec="http://schemas.microsoft.com/office/drawing/2017/decorative" val="1"/>
+                </a:ext>
+              </a:extLst>
+            </p:cNvPr>
+            <p:cNvSpPr/>
+            <p:nvPr>
+              <p:extLst>
+                <p:ext uri="{386F3935-93C4-4BCD-93E2-E3B085C9AB24}">
+                  <p16:designElem xmlns:p16="http://schemas.microsoft.com/office/powerpoint/2015/main" val="1"/>
+                </p:ext>
+              </p:extLst>
+            </p:nvPr>
+          </p:nvSpPr>
+          <p:spPr>
+            <a:xfrm>
+              <a:off x="8138122" y="73152"/>
+              <a:ext cx="54368" cy="59227"/>
+            </a:xfrm>
+            <a:prstGeom prst="ellipse">
+              <a:avLst/>
+            </a:prstGeom>
+            <a:solidFill>
+              <a:schemeClr val="accent1"/>
+            </a:solidFill>
+            <a:ln>
+              <a:noFill/>
+            </a:ln>
+          </p:spPr>
+          <p:style>
+            <a:lnRef idx="2">
+              <a:schemeClr val="accent1">
+                <a:shade val="50000"/>
+              </a:schemeClr>
+            </a:lnRef>
+            <a:fillRef idx="1">
+              <a:schemeClr val="accent1"/>
+            </a:fillRef>
+            <a:effectRef idx="0">
+              <a:schemeClr val="accent1"/>
+            </a:effectRef>
+            <a:fontRef idx="minor">
+              <a:schemeClr val="lt1"/>
+            </a:fontRef>
+          </p:style>
+          <p:txBody>
+            <a:bodyPr rtlCol="0" anchor="ctr"/>
+            <a:lstStyle/>
+            <a:p>
+              <a:pPr algn="ctr"/>
+              <a:endParaRPr lang="en-US"/>
+            </a:p>
+          </p:txBody>
+        </p:sp>
+        <p:sp>
+          <p:nvSpPr>
+            <p:cNvPr id="2061" name="Rectangle 66">
+              <a:extLst>
+                <a:ext uri="{FF2B5EF4-FFF2-40B4-BE49-F238E27FC236}">
+                  <a16:creationId xmlns:a16="http://schemas.microsoft.com/office/drawing/2014/main" id="{1A11DF2D-1D4B-45DA-906B-2A1F84C99647}"/>
+                </a:ext>
+                <a:ext uri="{C183D7F6-B498-43B3-948B-1728B52AA6E4}">
+                  <adec:decorative xmlns:adec="http://schemas.microsoft.com/office/drawing/2017/decorative" val="1"/>
+                </a:ext>
+              </a:extLst>
+            </p:cNvPr>
+            <p:cNvSpPr/>
+            <p:nvPr>
+              <p:extLst>
+                <p:ext uri="{386F3935-93C4-4BCD-93E2-E3B085C9AB24}">
+                  <p16:designElem xmlns:p16="http://schemas.microsoft.com/office/powerpoint/2015/main" val="1"/>
+                </p:ext>
+              </p:extLst>
+            </p:nvPr>
+          </p:nvSpPr>
+          <p:spPr>
+            <a:xfrm>
+              <a:off x="8138122" y="246888"/>
+              <a:ext cx="54368" cy="59227"/>
+            </a:xfrm>
+            <a:prstGeom prst="ellipse">
+              <a:avLst/>
+            </a:prstGeom>
+            <a:solidFill>
+              <a:schemeClr val="accent1"/>
+            </a:solidFill>
+            <a:ln>
+              <a:noFill/>
+            </a:ln>
+          </p:spPr>
+          <p:style>
+            <a:lnRef idx="2">
+              <a:schemeClr val="accent1">
+                <a:shade val="50000"/>
+              </a:schemeClr>
+            </a:lnRef>
+            <a:fillRef idx="1">
+              <a:schemeClr val="accent1"/>
+            </a:fillRef>
+            <a:effectRef idx="0">
+              <a:schemeClr val="accent1"/>
+            </a:effectRef>
+            <a:fontRef idx="minor">
+              <a:schemeClr val="lt1"/>
+            </a:fontRef>
+          </p:style>
+          <p:txBody>
+            <a:bodyPr rtlCol="0" anchor="ctr"/>
+            <a:lstStyle/>
+            <a:p>
+              <a:pPr algn="ctr"/>
+              <a:endParaRPr lang="en-US"/>
+            </a:p>
+          </p:txBody>
+        </p:sp>
+        <p:sp>
+          <p:nvSpPr>
+            <p:cNvPr id="148" name="Rectangle 64">
+              <a:extLst>
+                <a:ext uri="{FF2B5EF4-FFF2-40B4-BE49-F238E27FC236}">
+                  <a16:creationId xmlns:a16="http://schemas.microsoft.com/office/drawing/2014/main" id="{B6A5BAC0-9806-4124-A584-7F924A6589C8}"/>
+                </a:ext>
+                <a:ext uri="{C183D7F6-B498-43B3-948B-1728B52AA6E4}">
+                  <adec:decorative xmlns:adec="http://schemas.microsoft.com/office/drawing/2017/decorative" val="1"/>
+                </a:ext>
+              </a:extLst>
+            </p:cNvPr>
+            <p:cNvSpPr/>
+            <p:nvPr>
+              <p:extLst>
+                <p:ext uri="{386F3935-93C4-4BCD-93E2-E3B085C9AB24}">
+                  <p16:designElem xmlns:p16="http://schemas.microsoft.com/office/powerpoint/2015/main" val="1"/>
+                </p:ext>
+              </p:extLst>
+            </p:nvPr>
+          </p:nvSpPr>
+          <p:spPr>
+            <a:xfrm>
+              <a:off x="8013167" y="73152"/>
+              <a:ext cx="54368" cy="59227"/>
+            </a:xfrm>
+            <a:prstGeom prst="ellipse">
+              <a:avLst/>
+            </a:prstGeom>
+            <a:solidFill>
+              <a:schemeClr val="accent1"/>
+            </a:solidFill>
+            <a:ln>
+              <a:noFill/>
+            </a:ln>
+          </p:spPr>
+          <p:style>
+            <a:lnRef idx="2">
+              <a:schemeClr val="accent1">
+                <a:shade val="50000"/>
+              </a:schemeClr>
+            </a:lnRef>
+            <a:fillRef idx="1">
+              <a:schemeClr val="accent1"/>
+            </a:fillRef>
+            <a:effectRef idx="0">
+              <a:schemeClr val="accent1"/>
+            </a:effectRef>
+            <a:fontRef idx="minor">
+              <a:schemeClr val="lt1"/>
+            </a:fontRef>
+          </p:style>
+          <p:txBody>
+            <a:bodyPr rtlCol="0" anchor="ctr"/>
+            <a:lstStyle/>
+            <a:p>
+              <a:pPr algn="ctr"/>
+              <a:endParaRPr lang="en-US"/>
+            </a:p>
+          </p:txBody>
+        </p:sp>
+        <p:sp>
+          <p:nvSpPr>
+            <p:cNvPr id="2062" name="Rectangle 66">
+              <a:extLst>
+                <a:ext uri="{FF2B5EF4-FFF2-40B4-BE49-F238E27FC236}">
+                  <a16:creationId xmlns:a16="http://schemas.microsoft.com/office/drawing/2014/main" id="{A8F6BFA3-38BE-4F0A-94D9-EF0E6EA01A0B}"/>
+                </a:ext>
+                <a:ext uri="{C183D7F6-B498-43B3-948B-1728B52AA6E4}">
+                  <adec:decorative xmlns:adec="http://schemas.microsoft.com/office/drawing/2017/decorative" val="1"/>
+                </a:ext>
+              </a:extLst>
+            </p:cNvPr>
+            <p:cNvSpPr/>
+            <p:nvPr>
+              <p:extLst>
+                <p:ext uri="{386F3935-93C4-4BCD-93E2-E3B085C9AB24}">
+                  <p16:designElem xmlns:p16="http://schemas.microsoft.com/office/powerpoint/2015/main" val="1"/>
+                </p:ext>
+              </p:extLst>
+            </p:nvPr>
+          </p:nvSpPr>
+          <p:spPr>
+            <a:xfrm>
+              <a:off x="8013167" y="246888"/>
+              <a:ext cx="54368" cy="59227"/>
+            </a:xfrm>
+            <a:prstGeom prst="ellipse">
+              <a:avLst/>
+            </a:prstGeom>
+            <a:solidFill>
+              <a:schemeClr val="accent1"/>
+            </a:solidFill>
+            <a:ln>
+              <a:noFill/>
+            </a:ln>
+          </p:spPr>
+          <p:style>
+            <a:lnRef idx="2">
+              <a:schemeClr val="accent1">
+                <a:shade val="50000"/>
+              </a:schemeClr>
+            </a:lnRef>
+            <a:fillRef idx="1">
+              <a:schemeClr val="accent1"/>
+            </a:fillRef>
+            <a:effectRef idx="0">
+              <a:schemeClr val="accent1"/>
+            </a:effectRef>
+            <a:fontRef idx="minor">
+              <a:schemeClr val="lt1"/>
+            </a:fontRef>
+          </p:style>
+          <p:txBody>
+            <a:bodyPr rtlCol="0" anchor="ctr"/>
+            <a:lstStyle/>
+            <a:p>
+              <a:pPr algn="ctr"/>
+              <a:endParaRPr lang="en-US"/>
+            </a:p>
+          </p:txBody>
+        </p:sp>
+        <p:sp>
+          <p:nvSpPr>
+            <p:cNvPr id="150" name="Rectangle 64">
+              <a:extLst>
+                <a:ext uri="{FF2B5EF4-FFF2-40B4-BE49-F238E27FC236}">
+                  <a16:creationId xmlns:a16="http://schemas.microsoft.com/office/drawing/2014/main" id="{BE6BCF21-959F-419E-BCA4-B20AF92EF4F3}"/>
+                </a:ext>
+                <a:ext uri="{C183D7F6-B498-43B3-948B-1728B52AA6E4}">
+                  <adec:decorative xmlns:adec="http://schemas.microsoft.com/office/drawing/2017/decorative" val="1"/>
+                </a:ext>
+              </a:extLst>
+            </p:cNvPr>
+            <p:cNvSpPr/>
+            <p:nvPr>
+              <p:extLst>
+                <p:ext uri="{386F3935-93C4-4BCD-93E2-E3B085C9AB24}">
+                  <p16:designElem xmlns:p16="http://schemas.microsoft.com/office/powerpoint/2015/main" val="1"/>
+                </p:ext>
+              </p:extLst>
+            </p:nvPr>
+          </p:nvSpPr>
+          <p:spPr>
+            <a:xfrm>
+              <a:off x="7888211" y="73152"/>
+              <a:ext cx="54368" cy="59227"/>
+            </a:xfrm>
+            <a:prstGeom prst="ellipse">
+              <a:avLst/>
+            </a:prstGeom>
+            <a:solidFill>
+              <a:schemeClr val="accent1"/>
+            </a:solidFill>
+            <a:ln>
+              <a:noFill/>
+            </a:ln>
+          </p:spPr>
+          <p:style>
+            <a:lnRef idx="2">
+              <a:schemeClr val="accent1">
+                <a:shade val="50000"/>
+              </a:schemeClr>
+            </a:lnRef>
+            <a:fillRef idx="1">
+              <a:schemeClr val="accent1"/>
+            </a:fillRef>
+            <a:effectRef idx="0">
+              <a:schemeClr val="accent1"/>
+            </a:effectRef>
+            <a:fontRef idx="minor">
+              <a:schemeClr val="lt1"/>
+            </a:fontRef>
+          </p:style>
+          <p:txBody>
+            <a:bodyPr rtlCol="0" anchor="ctr"/>
+            <a:lstStyle/>
+            <a:p>
+              <a:pPr algn="ctr"/>
+              <a:endParaRPr lang="en-US"/>
+            </a:p>
+          </p:txBody>
+        </p:sp>
+        <p:sp>
+          <p:nvSpPr>
+            <p:cNvPr id="151" name="Rectangle 66">
+              <a:extLst>
+                <a:ext uri="{FF2B5EF4-FFF2-40B4-BE49-F238E27FC236}">
+                  <a16:creationId xmlns:a16="http://schemas.microsoft.com/office/drawing/2014/main" id="{54B6E037-E222-42EB-9AEB-C45EF2090AF6}"/>
+                </a:ext>
+                <a:ext uri="{C183D7F6-B498-43B3-948B-1728B52AA6E4}">
+                  <adec:decorative xmlns:adec="http://schemas.microsoft.com/office/drawing/2017/decorative" val="1"/>
+                </a:ext>
+              </a:extLst>
+            </p:cNvPr>
+            <p:cNvSpPr/>
+            <p:nvPr>
+              <p:extLst>
+                <p:ext uri="{386F3935-93C4-4BCD-93E2-E3B085C9AB24}">
+                  <p16:designElem xmlns:p16="http://schemas.microsoft.com/office/powerpoint/2015/main" val="1"/>
+                </p:ext>
+              </p:extLst>
+            </p:nvPr>
+          </p:nvSpPr>
+          <p:spPr>
+            <a:xfrm>
+              <a:off x="7888211" y="246888"/>
+              <a:ext cx="54368" cy="59227"/>
+            </a:xfrm>
+            <a:prstGeom prst="ellipse">
+              <a:avLst/>
+            </a:prstGeom>
+            <a:solidFill>
+              <a:schemeClr val="accent1"/>
+            </a:solidFill>
+            <a:ln>
+              <a:noFill/>
+            </a:ln>
+          </p:spPr>
+          <p:style>
+            <a:lnRef idx="2">
+              <a:schemeClr val="accent1">
+                <a:shade val="50000"/>
+              </a:schemeClr>
+            </a:lnRef>
+            <a:fillRef idx="1">
+              <a:schemeClr val="accent1"/>
+            </a:fillRef>
+            <a:effectRef idx="0">
+              <a:schemeClr val="accent1"/>
+            </a:effectRef>
+            <a:fontRef idx="minor">
+              <a:schemeClr val="lt1"/>
+            </a:fontRef>
+          </p:style>
+          <p:txBody>
+            <a:bodyPr rtlCol="0" anchor="ctr"/>
+            <a:lstStyle/>
+            <a:p>
+              <a:pPr algn="ctr"/>
+              <a:endParaRPr lang="en-US"/>
+            </a:p>
+          </p:txBody>
+        </p:sp>
+        <p:sp>
+          <p:nvSpPr>
+            <p:cNvPr id="152" name="Rectangle 64">
+              <a:extLst>
+                <a:ext uri="{FF2B5EF4-FFF2-40B4-BE49-F238E27FC236}">
+                  <a16:creationId xmlns:a16="http://schemas.microsoft.com/office/drawing/2014/main" id="{A0494426-372E-42B8-87E1-170F1B5969DF}"/>
+                </a:ext>
+                <a:ext uri="{C183D7F6-B498-43B3-948B-1728B52AA6E4}">
+                  <adec:decorative xmlns:adec="http://schemas.microsoft.com/office/drawing/2017/decorative" val="1"/>
+                </a:ext>
+              </a:extLst>
+            </p:cNvPr>
+            <p:cNvSpPr/>
+            <p:nvPr>
+              <p:extLst>
+                <p:ext uri="{386F3935-93C4-4BCD-93E2-E3B085C9AB24}">
+                  <p16:designElem xmlns:p16="http://schemas.microsoft.com/office/powerpoint/2015/main" val="1"/>
+                </p:ext>
+              </p:extLst>
+            </p:nvPr>
+          </p:nvSpPr>
+          <p:spPr>
+            <a:xfrm>
+              <a:off x="7763256" y="73152"/>
+              <a:ext cx="54368" cy="59227"/>
+            </a:xfrm>
+            <a:prstGeom prst="ellipse">
+              <a:avLst/>
+            </a:prstGeom>
+            <a:solidFill>
+              <a:schemeClr val="accent1"/>
+            </a:solidFill>
+            <a:ln>
+              <a:noFill/>
+            </a:ln>
+          </p:spPr>
+          <p:style>
+            <a:lnRef idx="2">
+              <a:schemeClr val="accent1">
+                <a:shade val="50000"/>
+              </a:schemeClr>
+            </a:lnRef>
+            <a:fillRef idx="1">
+              <a:schemeClr val="accent1"/>
+            </a:fillRef>
+            <a:effectRef idx="0">
+              <a:schemeClr val="accent1"/>
+            </a:effectRef>
+            <a:fontRef idx="minor">
+              <a:schemeClr val="lt1"/>
+            </a:fontRef>
+          </p:style>
+          <p:txBody>
+            <a:bodyPr rtlCol="0" anchor="ctr"/>
+            <a:lstStyle/>
+            <a:p>
+              <a:pPr algn="ctr"/>
+              <a:endParaRPr lang="en-US"/>
+            </a:p>
+          </p:txBody>
+        </p:sp>
+        <p:sp>
+          <p:nvSpPr>
+            <p:cNvPr id="153" name="Rectangle 66">
+              <a:extLst>
+                <a:ext uri="{FF2B5EF4-FFF2-40B4-BE49-F238E27FC236}">
+                  <a16:creationId xmlns:a16="http://schemas.microsoft.com/office/drawing/2014/main" id="{14DB5AB5-5D73-4375-8CF4-DF4B7A5D7F24}"/>
+                </a:ext>
+                <a:ext uri="{C183D7F6-B498-43B3-948B-1728B52AA6E4}">
+                  <adec:decorative xmlns:adec="http://schemas.microsoft.com/office/drawing/2017/decorative" val="1"/>
+                </a:ext>
+              </a:extLst>
+            </p:cNvPr>
+            <p:cNvSpPr/>
+            <p:nvPr>
+              <p:extLst>
+                <p:ext uri="{386F3935-93C4-4BCD-93E2-E3B085C9AB24}">
+                  <p16:designElem xmlns:p16="http://schemas.microsoft.com/office/powerpoint/2015/main" val="1"/>
+                </p:ext>
+              </p:extLst>
+            </p:nvPr>
+          </p:nvSpPr>
+          <p:spPr>
+            <a:xfrm>
+              <a:off x="7763256" y="246888"/>
+              <a:ext cx="54368" cy="59227"/>
+            </a:xfrm>
+            <a:prstGeom prst="ellipse">
+              <a:avLst/>
+            </a:prstGeom>
+            <a:solidFill>
+              <a:schemeClr val="accent1"/>
+            </a:solidFill>
+            <a:ln>
+              <a:noFill/>
+            </a:ln>
+          </p:spPr>
+          <p:style>
+            <a:lnRef idx="2">
+              <a:schemeClr val="accent1">
+                <a:shade val="50000"/>
+              </a:schemeClr>
+            </a:lnRef>
+            <a:fillRef idx="1">
+              <a:schemeClr val="accent1"/>
+            </a:fillRef>
+            <a:effectRef idx="0">
+              <a:schemeClr val="accent1"/>
+            </a:effectRef>
+            <a:fontRef idx="minor">
+              <a:schemeClr val="lt1"/>
+            </a:fontRef>
+          </p:style>
+          <p:txBody>
+            <a:bodyPr rtlCol="0" anchor="ctr"/>
+            <a:lstStyle/>
+            <a:p>
+              <a:pPr algn="ctr"/>
+              <a:endParaRPr lang="en-US"/>
+            </a:p>
+          </p:txBody>
+        </p:sp>
+        <p:sp>
+          <p:nvSpPr>
+            <p:cNvPr id="154" name="Rectangle 64">
+              <a:extLst>
+                <a:ext uri="{FF2B5EF4-FFF2-40B4-BE49-F238E27FC236}">
+                  <a16:creationId xmlns:a16="http://schemas.microsoft.com/office/drawing/2014/main" id="{009B2A6E-6D36-4A9A-AFAA-CF4D8591470D}"/>
+                </a:ext>
+                <a:ext uri="{C183D7F6-B498-43B3-948B-1728B52AA6E4}">
+                  <adec:decorative xmlns:adec="http://schemas.microsoft.com/office/drawing/2017/decorative" val="1"/>
+                </a:ext>
+              </a:extLst>
+            </p:cNvPr>
+            <p:cNvSpPr/>
+            <p:nvPr>
+              <p:extLst>
+                <p:ext uri="{386F3935-93C4-4BCD-93E2-E3B085C9AB24}">
+                  <p16:designElem xmlns:p16="http://schemas.microsoft.com/office/powerpoint/2015/main" val="1"/>
+                </p:ext>
+              </p:extLst>
+            </p:nvPr>
+          </p:nvSpPr>
+          <p:spPr>
+            <a:xfrm>
+              <a:off x="8887854" y="73152"/>
+              <a:ext cx="54368" cy="59227"/>
+            </a:xfrm>
+            <a:prstGeom prst="ellipse">
+              <a:avLst/>
+            </a:prstGeom>
+            <a:solidFill>
+              <a:schemeClr val="accent1"/>
+            </a:solidFill>
+            <a:ln>
+              <a:noFill/>
+            </a:ln>
+          </p:spPr>
+          <p:style>
+            <a:lnRef idx="2">
+              <a:schemeClr val="accent1">
+                <a:shade val="50000"/>
+              </a:schemeClr>
+            </a:lnRef>
+            <a:fillRef idx="1">
+              <a:schemeClr val="accent1"/>
+            </a:fillRef>
+            <a:effectRef idx="0">
+              <a:schemeClr val="accent1"/>
+            </a:effectRef>
+            <a:fontRef idx="minor">
+              <a:schemeClr val="lt1"/>
+            </a:fontRef>
+          </p:style>
+          <p:txBody>
+            <a:bodyPr rtlCol="0" anchor="ctr"/>
+            <a:lstStyle/>
+            <a:p>
+              <a:pPr algn="ctr"/>
+              <a:endParaRPr lang="en-US"/>
+            </a:p>
+          </p:txBody>
+        </p:sp>
+        <p:sp>
+          <p:nvSpPr>
+            <p:cNvPr id="155" name="Rectangle 66">
+              <a:extLst>
+                <a:ext uri="{FF2B5EF4-FFF2-40B4-BE49-F238E27FC236}">
+                  <a16:creationId xmlns:a16="http://schemas.microsoft.com/office/drawing/2014/main" id="{85DC0718-B29F-47A6-931F-F0EF9FA995D9}"/>
+                </a:ext>
+                <a:ext uri="{C183D7F6-B498-43B3-948B-1728B52AA6E4}">
+                  <adec:decorative xmlns:adec="http://schemas.microsoft.com/office/drawing/2017/decorative" val="1"/>
+                </a:ext>
+              </a:extLst>
+            </p:cNvPr>
+            <p:cNvSpPr/>
+            <p:nvPr>
+              <p:extLst>
+                <p:ext uri="{386F3935-93C4-4BCD-93E2-E3B085C9AB24}">
+                  <p16:designElem xmlns:p16="http://schemas.microsoft.com/office/powerpoint/2015/main" val="1"/>
+                </p:ext>
+              </p:extLst>
+            </p:nvPr>
+          </p:nvSpPr>
+          <p:spPr>
+            <a:xfrm>
+              <a:off x="8887854" y="246888"/>
+              <a:ext cx="54368" cy="59227"/>
+            </a:xfrm>
+            <a:prstGeom prst="ellipse">
+              <a:avLst/>
+            </a:prstGeom>
+            <a:solidFill>
+              <a:schemeClr val="accent1"/>
+            </a:solidFill>
+            <a:ln>
+              <a:noFill/>
+            </a:ln>
+          </p:spPr>
+          <p:style>
+            <a:lnRef idx="2">
+              <a:schemeClr val="accent1">
+                <a:shade val="50000"/>
+              </a:schemeClr>
+            </a:lnRef>
+            <a:fillRef idx="1">
+              <a:schemeClr val="accent1"/>
+            </a:fillRef>
+            <a:effectRef idx="0">
+              <a:schemeClr val="accent1"/>
+            </a:effectRef>
+            <a:fontRef idx="minor">
+              <a:schemeClr val="lt1"/>
+            </a:fontRef>
+          </p:style>
+          <p:txBody>
+            <a:bodyPr rtlCol="0" anchor="ctr"/>
+            <a:lstStyle/>
+            <a:p>
+              <a:pPr algn="ctr"/>
+              <a:endParaRPr lang="en-US"/>
+            </a:p>
+          </p:txBody>
+        </p:sp>
+        <p:sp>
+          <p:nvSpPr>
+            <p:cNvPr id="156" name="Rectangle 64">
+              <a:extLst>
+                <a:ext uri="{FF2B5EF4-FFF2-40B4-BE49-F238E27FC236}">
+                  <a16:creationId xmlns:a16="http://schemas.microsoft.com/office/drawing/2014/main" id="{AAED958D-AFCC-4BEF-818A-EFF7E41D1752}"/>
+                </a:ext>
+                <a:ext uri="{C183D7F6-B498-43B3-948B-1728B52AA6E4}">
+                  <adec:decorative xmlns:adec="http://schemas.microsoft.com/office/drawing/2017/decorative" val="1"/>
+                </a:ext>
+              </a:extLst>
+            </p:cNvPr>
+            <p:cNvSpPr/>
+            <p:nvPr>
+              <p:extLst>
+                <p:ext uri="{386F3935-93C4-4BCD-93E2-E3B085C9AB24}">
+                  <p16:designElem xmlns:p16="http://schemas.microsoft.com/office/powerpoint/2015/main" val="1"/>
+                </p:ext>
+              </p:extLst>
+            </p:nvPr>
+          </p:nvSpPr>
+          <p:spPr>
+            <a:xfrm>
+              <a:off x="8762899" y="73152"/>
+              <a:ext cx="54368" cy="59227"/>
+            </a:xfrm>
+            <a:prstGeom prst="ellipse">
+              <a:avLst/>
+            </a:prstGeom>
+            <a:solidFill>
+              <a:schemeClr val="accent1"/>
+            </a:solidFill>
+            <a:ln>
+              <a:noFill/>
+            </a:ln>
+          </p:spPr>
+          <p:style>
+            <a:lnRef idx="2">
+              <a:schemeClr val="accent1">
+                <a:shade val="50000"/>
+              </a:schemeClr>
+            </a:lnRef>
+            <a:fillRef idx="1">
+              <a:schemeClr val="accent1"/>
+            </a:fillRef>
+            <a:effectRef idx="0">
+              <a:schemeClr val="accent1"/>
+            </a:effectRef>
+            <a:fontRef idx="minor">
+              <a:schemeClr val="lt1"/>
+            </a:fontRef>
+          </p:style>
+          <p:txBody>
+            <a:bodyPr rtlCol="0" anchor="ctr"/>
+            <a:lstStyle/>
+            <a:p>
+              <a:pPr algn="ctr"/>
+              <a:endParaRPr lang="en-US"/>
+            </a:p>
+          </p:txBody>
+        </p:sp>
+        <p:sp>
+          <p:nvSpPr>
+            <p:cNvPr id="157" name="Rectangle 66">
+              <a:extLst>
+                <a:ext uri="{FF2B5EF4-FFF2-40B4-BE49-F238E27FC236}">
+                  <a16:creationId xmlns:a16="http://schemas.microsoft.com/office/drawing/2014/main" id="{C216DD5A-D1AE-429E-937E-456A50345E2F}"/>
+                </a:ext>
+                <a:ext uri="{C183D7F6-B498-43B3-948B-1728B52AA6E4}">
+                  <adec:decorative xmlns:adec="http://schemas.microsoft.com/office/drawing/2017/decorative" val="1"/>
+                </a:ext>
+              </a:extLst>
+            </p:cNvPr>
+            <p:cNvSpPr/>
+            <p:nvPr>
+              <p:extLst>
+                <p:ext uri="{386F3935-93C4-4BCD-93E2-E3B085C9AB24}">
+                  <p16:designElem xmlns:p16="http://schemas.microsoft.com/office/powerpoint/2015/main" val="1"/>
+                </p:ext>
+              </p:extLst>
+            </p:nvPr>
+          </p:nvSpPr>
+          <p:spPr>
+            <a:xfrm>
+              <a:off x="8762899" y="246888"/>
+              <a:ext cx="54368" cy="59227"/>
+            </a:xfrm>
+            <a:prstGeom prst="ellipse">
+              <a:avLst/>
+            </a:prstGeom>
+            <a:solidFill>
+              <a:schemeClr val="accent1"/>
+            </a:solidFill>
+            <a:ln>
+              <a:noFill/>
+            </a:ln>
+          </p:spPr>
+          <p:style>
+            <a:lnRef idx="2">
+              <a:schemeClr val="accent1">
+                <a:shade val="50000"/>
+              </a:schemeClr>
+            </a:lnRef>
+            <a:fillRef idx="1">
+              <a:schemeClr val="accent1"/>
+            </a:fillRef>
+            <a:effectRef idx="0">
+              <a:schemeClr val="accent1"/>
+            </a:effectRef>
+            <a:fontRef idx="minor">
+              <a:schemeClr val="lt1"/>
+            </a:fontRef>
+          </p:style>
+          <p:txBody>
+            <a:bodyPr rtlCol="0" anchor="ctr"/>
+            <a:lstStyle/>
+            <a:p>
+              <a:pPr algn="ctr"/>
+              <a:endParaRPr lang="en-US"/>
+            </a:p>
+          </p:txBody>
+        </p:sp>
+        <p:sp>
+          <p:nvSpPr>
+            <p:cNvPr id="158" name="Rectangle 64">
+              <a:extLst>
+                <a:ext uri="{FF2B5EF4-FFF2-40B4-BE49-F238E27FC236}">
+                  <a16:creationId xmlns:a16="http://schemas.microsoft.com/office/drawing/2014/main" id="{A845B253-9DEE-45AC-AADA-FAA6812C3968}"/>
+                </a:ext>
+                <a:ext uri="{C183D7F6-B498-43B3-948B-1728B52AA6E4}">
+                  <adec:decorative xmlns:adec="http://schemas.microsoft.com/office/drawing/2017/decorative" val="1"/>
+                </a:ext>
+              </a:extLst>
+            </p:cNvPr>
+            <p:cNvSpPr/>
+            <p:nvPr>
+              <p:extLst>
+                <p:ext uri="{386F3935-93C4-4BCD-93E2-E3B085C9AB24}">
+                  <p16:designElem xmlns:p16="http://schemas.microsoft.com/office/powerpoint/2015/main" val="1"/>
+                </p:ext>
+              </p:extLst>
+            </p:nvPr>
+          </p:nvSpPr>
+          <p:spPr>
+            <a:xfrm>
+              <a:off x="8637944" y="73152"/>
+              <a:ext cx="54368" cy="59227"/>
+            </a:xfrm>
+            <a:prstGeom prst="ellipse">
+              <a:avLst/>
+            </a:prstGeom>
+            <a:solidFill>
+              <a:schemeClr val="accent1"/>
+            </a:solidFill>
+            <a:ln>
+              <a:noFill/>
+            </a:ln>
+          </p:spPr>
+          <p:style>
+            <a:lnRef idx="2">
+              <a:schemeClr val="accent1">
+                <a:shade val="50000"/>
+              </a:schemeClr>
+            </a:lnRef>
+            <a:fillRef idx="1">
+              <a:schemeClr val="accent1"/>
+            </a:fillRef>
+            <a:effectRef idx="0">
+              <a:schemeClr val="accent1"/>
+            </a:effectRef>
+            <a:fontRef idx="minor">
+              <a:schemeClr val="lt1"/>
+            </a:fontRef>
+          </p:style>
+          <p:txBody>
+            <a:bodyPr rtlCol="0" anchor="ctr"/>
+            <a:lstStyle/>
+            <a:p>
+              <a:pPr algn="ctr"/>
+              <a:endParaRPr lang="en-US"/>
+            </a:p>
+          </p:txBody>
+        </p:sp>
+        <p:sp>
+          <p:nvSpPr>
+            <p:cNvPr id="159" name="Rectangle 66">
+              <a:extLst>
+                <a:ext uri="{FF2B5EF4-FFF2-40B4-BE49-F238E27FC236}">
+                  <a16:creationId xmlns:a16="http://schemas.microsoft.com/office/drawing/2014/main" id="{CE7B6CBF-757B-4B55-84CB-062B712D38EE}"/>
+                </a:ext>
+                <a:ext uri="{C183D7F6-B498-43B3-948B-1728B52AA6E4}">
+                  <adec:decorative xmlns:adec="http://schemas.microsoft.com/office/drawing/2017/decorative" val="1"/>
+                </a:ext>
+              </a:extLst>
+            </p:cNvPr>
+            <p:cNvSpPr/>
+            <p:nvPr>
+              <p:extLst>
+                <p:ext uri="{386F3935-93C4-4BCD-93E2-E3B085C9AB24}">
+                  <p16:designElem xmlns:p16="http://schemas.microsoft.com/office/powerpoint/2015/main" val="1"/>
+                </p:ext>
+              </p:extLst>
+            </p:nvPr>
+          </p:nvSpPr>
+          <p:spPr>
+            <a:xfrm>
+              <a:off x="8637944" y="246888"/>
+              <a:ext cx="54368" cy="59227"/>
+            </a:xfrm>
+            <a:prstGeom prst="ellipse">
+              <a:avLst/>
+            </a:prstGeom>
+            <a:solidFill>
+              <a:schemeClr val="accent1"/>
+            </a:solidFill>
+            <a:ln>
+              <a:noFill/>
+            </a:ln>
+          </p:spPr>
+          <p:style>
+            <a:lnRef idx="2">
+              <a:schemeClr val="accent1">
+                <a:shade val="50000"/>
+              </a:schemeClr>
+            </a:lnRef>
+            <a:fillRef idx="1">
+              <a:schemeClr val="accent1"/>
+            </a:fillRef>
+            <a:effectRef idx="0">
+              <a:schemeClr val="accent1"/>
+            </a:effectRef>
+            <a:fontRef idx="minor">
+              <a:schemeClr val="lt1"/>
+            </a:fontRef>
+          </p:style>
+          <p:txBody>
+            <a:bodyPr rtlCol="0" anchor="ctr"/>
+            <a:lstStyle/>
+            <a:p>
+              <a:pPr algn="ctr"/>
+              <a:endParaRPr lang="en-US"/>
+            </a:p>
+          </p:txBody>
+        </p:sp>
+        <p:sp>
+          <p:nvSpPr>
+            <p:cNvPr id="160" name="Rectangle 64">
+              <a:extLst>
+                <a:ext uri="{FF2B5EF4-FFF2-40B4-BE49-F238E27FC236}">
+                  <a16:creationId xmlns:a16="http://schemas.microsoft.com/office/drawing/2014/main" id="{2CC28C7A-EF33-43D3-90CD-DCAC92546A11}"/>
+                </a:ext>
+                <a:ext uri="{C183D7F6-B498-43B3-948B-1728B52AA6E4}">
+                  <adec:decorative xmlns:adec="http://schemas.microsoft.com/office/drawing/2017/decorative" val="1"/>
+                </a:ext>
+              </a:extLst>
+            </p:cNvPr>
+            <p:cNvSpPr/>
+            <p:nvPr>
+              <p:extLst>
+                <p:ext uri="{386F3935-93C4-4BCD-93E2-E3B085C9AB24}">
+                  <p16:designElem xmlns:p16="http://schemas.microsoft.com/office/powerpoint/2015/main" val="1"/>
+                </p:ext>
+              </p:extLst>
+            </p:nvPr>
+          </p:nvSpPr>
+          <p:spPr>
+            <a:xfrm>
+              <a:off x="8512988" y="73152"/>
+              <a:ext cx="54368" cy="59227"/>
+            </a:xfrm>
+            <a:prstGeom prst="ellipse">
+              <a:avLst/>
+            </a:prstGeom>
+            <a:solidFill>
+              <a:schemeClr val="accent1"/>
+            </a:solidFill>
+            <a:ln>
+              <a:noFill/>
+            </a:ln>
+          </p:spPr>
+          <p:style>
+            <a:lnRef idx="2">
+              <a:schemeClr val="accent1">
+                <a:shade val="50000"/>
+              </a:schemeClr>
+            </a:lnRef>
+            <a:fillRef idx="1">
+              <a:schemeClr val="accent1"/>
+            </a:fillRef>
+            <a:effectRef idx="0">
+              <a:schemeClr val="accent1"/>
+            </a:effectRef>
+            <a:fontRef idx="minor">
+              <a:schemeClr val="lt1"/>
+            </a:fontRef>
+          </p:style>
+          <p:txBody>
+            <a:bodyPr rtlCol="0" anchor="ctr"/>
+            <a:lstStyle/>
+            <a:p>
+              <a:pPr algn="ctr"/>
+              <a:endParaRPr lang="en-US"/>
+            </a:p>
+          </p:txBody>
+        </p:sp>
+        <p:sp>
+          <p:nvSpPr>
+            <p:cNvPr id="161" name="Rectangle 66">
+              <a:extLst>
+                <a:ext uri="{FF2B5EF4-FFF2-40B4-BE49-F238E27FC236}">
+                  <a16:creationId xmlns:a16="http://schemas.microsoft.com/office/drawing/2014/main" id="{BC0C9DCF-F15B-4B7A-A16B-37B4335E6BD2}"/>
+                </a:ext>
+                <a:ext uri="{C183D7F6-B498-43B3-948B-1728B52AA6E4}">
+                  <adec:decorative xmlns:adec="http://schemas.microsoft.com/office/drawing/2017/decorative" val="1"/>
+                </a:ext>
+              </a:extLst>
+            </p:cNvPr>
+            <p:cNvSpPr/>
+            <p:nvPr>
+              <p:extLst>
+                <p:ext uri="{386F3935-93C4-4BCD-93E2-E3B085C9AB24}">
+                  <p16:designElem xmlns:p16="http://schemas.microsoft.com/office/powerpoint/2015/main" val="1"/>
+                </p:ext>
+              </p:extLst>
+            </p:nvPr>
+          </p:nvSpPr>
+          <p:spPr>
+            <a:xfrm>
+              <a:off x="8512988" y="246888"/>
+              <a:ext cx="54368" cy="59227"/>
+            </a:xfrm>
+            <a:prstGeom prst="ellipse">
+              <a:avLst/>
+            </a:prstGeom>
+            <a:solidFill>
+              <a:schemeClr val="accent1"/>
+            </a:solidFill>
+            <a:ln>
+              <a:noFill/>
+            </a:ln>
+          </p:spPr>
+          <p:style>
+            <a:lnRef idx="2">
+              <a:schemeClr val="accent1">
+                <a:shade val="50000"/>
+              </a:schemeClr>
+            </a:lnRef>
+            <a:fillRef idx="1">
+              <a:schemeClr val="accent1"/>
+            </a:fillRef>
+            <a:effectRef idx="0">
+              <a:schemeClr val="accent1"/>
+            </a:effectRef>
+            <a:fontRef idx="minor">
+              <a:schemeClr val="lt1"/>
+            </a:fontRef>
+          </p:style>
+          <p:txBody>
+            <a:bodyPr rtlCol="0" anchor="ctr"/>
+            <a:lstStyle/>
+            <a:p>
+              <a:pPr algn="ctr"/>
+              <a:endParaRPr lang="en-US"/>
+            </a:p>
+          </p:txBody>
+        </p:sp>
+        <p:sp>
+          <p:nvSpPr>
+            <p:cNvPr id="162" name="Rectangle 64">
+              <a:extLst>
+                <a:ext uri="{FF2B5EF4-FFF2-40B4-BE49-F238E27FC236}">
+                  <a16:creationId xmlns:a16="http://schemas.microsoft.com/office/drawing/2014/main" id="{94991FD1-406A-4958-87D4-8DFA9FEA4C01}"/>
+                </a:ext>
+                <a:ext uri="{C183D7F6-B498-43B3-948B-1728B52AA6E4}">
+                  <adec:decorative xmlns:adec="http://schemas.microsoft.com/office/drawing/2017/decorative" val="1"/>
+                </a:ext>
+              </a:extLst>
+            </p:cNvPr>
+            <p:cNvSpPr/>
+            <p:nvPr>
+              <p:extLst>
+                <p:ext uri="{386F3935-93C4-4BCD-93E2-E3B085C9AB24}">
+                  <p16:designElem xmlns:p16="http://schemas.microsoft.com/office/powerpoint/2015/main" val="1"/>
+                </p:ext>
+              </p:extLst>
+            </p:nvPr>
+          </p:nvSpPr>
+          <p:spPr>
+            <a:xfrm>
+              <a:off x="8388033" y="73152"/>
+              <a:ext cx="54368" cy="59227"/>
+            </a:xfrm>
+            <a:prstGeom prst="ellipse">
+              <a:avLst/>
+            </a:prstGeom>
+            <a:solidFill>
+              <a:schemeClr val="accent1"/>
+            </a:solidFill>
+            <a:ln>
+              <a:noFill/>
+            </a:ln>
+          </p:spPr>
+          <p:style>
+            <a:lnRef idx="2">
+              <a:schemeClr val="accent1">
+                <a:shade val="50000"/>
+              </a:schemeClr>
+            </a:lnRef>
+            <a:fillRef idx="1">
+              <a:schemeClr val="accent1"/>
+            </a:fillRef>
+            <a:effectRef idx="0">
+              <a:schemeClr val="accent1"/>
+            </a:effectRef>
+            <a:fontRef idx="minor">
+              <a:schemeClr val="lt1"/>
+            </a:fontRef>
+          </p:style>
+          <p:txBody>
+            <a:bodyPr rtlCol="0" anchor="ctr"/>
+            <a:lstStyle/>
+            <a:p>
+              <a:pPr algn="ctr"/>
+              <a:endParaRPr lang="en-US"/>
+            </a:p>
+          </p:txBody>
+        </p:sp>
+        <p:sp>
+          <p:nvSpPr>
+            <p:cNvPr id="163" name="Rectangle 66">
+              <a:extLst>
+                <a:ext uri="{FF2B5EF4-FFF2-40B4-BE49-F238E27FC236}">
+                  <a16:creationId xmlns:a16="http://schemas.microsoft.com/office/drawing/2014/main" id="{5CD32F69-27AD-4088-877C-E2A40F8B0733}"/>
+                </a:ext>
+                <a:ext uri="{C183D7F6-B498-43B3-948B-1728B52AA6E4}">
+                  <adec:decorative xmlns:adec="http://schemas.microsoft.com/office/drawing/2017/decorative" val="1"/>
+                </a:ext>
+              </a:extLst>
+            </p:cNvPr>
+            <p:cNvSpPr/>
+            <p:nvPr>
+              <p:extLst>
+                <p:ext uri="{386F3935-93C4-4BCD-93E2-E3B085C9AB24}">
+                  <p16:designElem xmlns:p16="http://schemas.microsoft.com/office/powerpoint/2015/main" val="1"/>
+                </p:ext>
+              </p:extLst>
+            </p:nvPr>
+          </p:nvSpPr>
+          <p:spPr>
+            <a:xfrm>
+              <a:off x="8388033" y="246888"/>
+              <a:ext cx="54368" cy="59227"/>
+            </a:xfrm>
+            <a:prstGeom prst="ellipse">
+              <a:avLst/>
+            </a:prstGeom>
+            <a:solidFill>
+              <a:schemeClr val="accent1"/>
+            </a:solidFill>
+            <a:ln>
+              <a:noFill/>
+            </a:ln>
+          </p:spPr>
+          <p:style>
+            <a:lnRef idx="2">
+              <a:schemeClr val="accent1">
+                <a:shade val="50000"/>
+              </a:schemeClr>
+            </a:lnRef>
+            <a:fillRef idx="1">
+              <a:schemeClr val="accent1"/>
+            </a:fillRef>
+            <a:effectRef idx="0">
+              <a:schemeClr val="accent1"/>
+            </a:effectRef>
+            <a:fontRef idx="minor">
+              <a:schemeClr val="lt1"/>
+            </a:fontRef>
+          </p:style>
+          <p:txBody>
+            <a:bodyPr rtlCol="0" anchor="ctr"/>
+            <a:lstStyle/>
+            <a:p>
+              <a:pPr algn="ctr"/>
+              <a:endParaRPr lang="en-US"/>
+            </a:p>
+          </p:txBody>
+        </p:sp>
+      </p:grpSp>
       <p:pic>
         <p:nvPicPr>
-          <p:cNvPr id="2050" name="Picture 2">
+          <p:cNvPr id="2052" name="Picture 4">
             <a:extLst>
               <a:ext uri="{FF2B5EF4-FFF2-40B4-BE49-F238E27FC236}">
-                <a16:creationId xmlns:a16="http://schemas.microsoft.com/office/drawing/2014/main" id="{379A696E-1652-4544-B510-D58F6348DC79}"/>
+                <a16:creationId xmlns:a16="http://schemas.microsoft.com/office/drawing/2014/main" id="{5125E0F3-BBC0-4200-9E00-466DB009861A}"/>
               </a:ext>
             </a:extLst>
           </p:cNvPr>
           <p:cNvPicPr>
-            <a:picLocks noGrp="1" noChangeAspect="1" noChangeArrowheads="1"/>
+            <a:picLocks noChangeAspect="1" noChangeArrowheads="1"/>
           </p:cNvPicPr>
-          <p:nvPr>
-            <p:ph idx="1"/>
-          </p:nvPr>
+          <p:nvPr/>
         </p:nvPicPr>
-        <p:blipFill>
-          <a:blip r:embed="rId2">
+        <p:blipFill rotWithShape="1">
+          <a:blip r:embed="rId3">
             <a:extLst>
               <a:ext uri="{28A0092B-C50C-407E-A947-70E740481C1C}">
                 <a14:useLocalDpi xmlns:a14="http://schemas.microsoft.com/office/drawing/2010/main" val="0"/>
               </a:ext>
             </a:extLst>
           </a:blip>
-          <a:stretch>
-            <a:fillRect/>
-          </a:stretch>
+          <a:srcRect r="2" b="2867"/>
+          <a:stretch/>
         </p:blipFill>
         <p:spPr bwMode="auto">
           <a:xfrm>
-            <a:off x="331567" y="2882348"/>
-            <a:ext cx="5455917" cy="3205369"/>
+            <a:off x="6287052" y="3708880"/>
+            <a:ext cx="5699992" cy="2960829"/>
           </a:xfrm>
           <a:prstGeom prst="rect">
             <a:avLst/>
@@ -11589,21 +14111,21 @@
           </a:extLst>
         </p:spPr>
       </p:pic>
-      <p:cxnSp>
-        <p:nvCxnSpPr>
-          <p:cNvPr id="77" name="Straight Connector 76">
+      <p:sp>
+        <p:nvSpPr>
+          <p:cNvPr id="165" name="Rectangle 164">
             <a:extLst>
               <a:ext uri="{FF2B5EF4-FFF2-40B4-BE49-F238E27FC236}">
-                <a16:creationId xmlns:a16="http://schemas.microsoft.com/office/drawing/2014/main" id="{DB146403-F3D6-484B-B2ED-97F9565D0370}"/>
+                <a16:creationId xmlns:a16="http://schemas.microsoft.com/office/drawing/2014/main" id="{D9F5512A-48E1-4C07-B75E-3CCC517B6804}"/>
               </a:ext>
               <a:ext uri="{C183D7F6-B498-43B3-948B-1728B52AA6E4}">
                 <adec:decorative xmlns:adec="http://schemas.microsoft.com/office/drawing/2017/decorative" val="1"/>
               </a:ext>
             </a:extLst>
           </p:cNvPr>
-          <p:cNvCxnSpPr>
-            <a:cxnSpLocks noGrp="1" noRot="1" noChangeAspect="1" noMove="1" noResize="1" noEditPoints="1" noAdjustHandles="1" noChangeArrowheads="1" noChangeShapeType="1"/>
-          </p:cNvCxnSpPr>
+          <p:cNvSpPr>
+            <a:spLocks noGrp="1" noRot="1" noChangeAspect="1" noMove="1" noResize="1" noEditPoints="1" noAdjustHandles="1" noChangeArrowheads="1" noChangeShapeType="1" noTextEdit="1"/>
+          </p:cNvSpPr>
           <p:nvPr>
             <p:extLst>
               <p:ext uri="{386F3935-93C4-4BCD-93E2-E3B085C9AB24}">
@@ -11611,42 +14133,53 @@
               </p:ext>
             </p:extLst>
           </p:nvPr>
-        </p:nvCxnSpPr>
+        </p:nvSpPr>
         <p:spPr>
           <a:xfrm>
-            <a:off x="6116278" y="2596836"/>
-            <a:ext cx="0" cy="3657600"/>
+            <a:off x="-1" y="3233984"/>
+            <a:ext cx="606972" cy="3624015"/>
           </a:xfrm>
-          <a:prstGeom prst="line">
+          <a:prstGeom prst="rect">
             <a:avLst/>
           </a:prstGeom>
-          <a:ln w="101600" cmpd="dbl">
-            <a:solidFill>
-              <a:srgbClr val="595959"/>
-            </a:solidFill>
+          <a:solidFill>
+            <a:schemeClr val="accent1"/>
+          </a:solidFill>
+          <a:ln>
+            <a:noFill/>
           </a:ln>
         </p:spPr>
         <p:style>
-          <a:lnRef idx="1">
-            <a:schemeClr val="accent1"/>
+          <a:lnRef idx="2">
+            <a:schemeClr val="accent1">
+              <a:shade val="50000"/>
+            </a:schemeClr>
           </a:lnRef>
-          <a:fillRef idx="0">
+          <a:fillRef idx="1">
             <a:schemeClr val="accent1"/>
           </a:fillRef>
           <a:effectRef idx="0">
             <a:schemeClr val="accent1"/>
           </a:effectRef>
           <a:fontRef idx="minor">
-            <a:schemeClr val="tx1"/>
+            <a:schemeClr val="lt1"/>
           </a:fontRef>
         </p:style>
-      </p:cxnSp>
+        <p:txBody>
+          <a:bodyPr rtlCol="0" anchor="ctr"/>
+          <a:lstStyle/>
+          <a:p>
+            <a:pPr algn="ctr"/>
+            <a:endParaRPr lang="en-US"/>
+          </a:p>
+        </p:txBody>
+      </p:sp>
       <p:pic>
         <p:nvPicPr>
-          <p:cNvPr id="2052" name="Picture 4">
+          <p:cNvPr id="2054" name="Picture 6">
             <a:extLst>
               <a:ext uri="{FF2B5EF4-FFF2-40B4-BE49-F238E27FC236}">
-                <a16:creationId xmlns:a16="http://schemas.microsoft.com/office/drawing/2014/main" id="{5125E0F3-BBC0-4200-9E00-466DB009861A}"/>
+                <a16:creationId xmlns:a16="http://schemas.microsoft.com/office/drawing/2014/main" id="{3E31078B-0492-4418-BA7B-9404BAFDD604}"/>
               </a:ext>
             </a:extLst>
           </p:cNvPr>
@@ -11655,22 +14188,66 @@
           </p:cNvPicPr>
           <p:nvPr/>
         </p:nvPicPr>
-        <p:blipFill>
-          <a:blip r:embed="rId3">
+        <p:blipFill rotWithShape="1">
+          <a:blip r:embed="rId4">
             <a:extLst>
               <a:ext uri="{28A0092B-C50C-407E-A947-70E740481C1C}">
                 <a14:useLocalDpi xmlns:a14="http://schemas.microsoft.com/office/drawing/2010/main" val="0"/>
               </a:ext>
             </a:extLst>
           </a:blip>
-          <a:stretch>
-            <a:fillRect/>
-          </a:stretch>
+          <a:srcRect r="2" b="7950"/>
+          <a:stretch/>
         </p:blipFill>
         <p:spPr bwMode="auto">
           <a:xfrm>
-            <a:off x="6445073" y="2882348"/>
-            <a:ext cx="5455917" cy="3205369"/>
+            <a:off x="700109" y="3937937"/>
+            <a:ext cx="5586942" cy="2548780"/>
+          </a:xfrm>
+          <a:prstGeom prst="rect">
+            <a:avLst/>
+          </a:prstGeom>
+          <a:noFill/>
+          <a:extLst>
+            <a:ext uri="{909E8E84-426E-40DD-AFC4-6F175D3DCCD1}">
+              <a14:hiddenFill xmlns:a14="http://schemas.microsoft.com/office/drawing/2010/main">
+                <a:solidFill>
+                  <a:srgbClr val="FFFFFF"/>
+                </a:solidFill>
+              </a14:hiddenFill>
+            </a:ext>
+          </a:extLst>
+        </p:spPr>
+      </p:pic>
+      <p:pic>
+        <p:nvPicPr>
+          <p:cNvPr id="2050" name="Picture 2">
+            <a:extLst>
+              <a:ext uri="{FF2B5EF4-FFF2-40B4-BE49-F238E27FC236}">
+                <a16:creationId xmlns:a16="http://schemas.microsoft.com/office/drawing/2014/main" id="{379A696E-1652-4544-B510-D58F6348DC79}"/>
+              </a:ext>
+            </a:extLst>
+          </p:cNvPr>
+          <p:cNvPicPr>
+            <a:picLocks noChangeAspect="1" noChangeArrowheads="1"/>
+          </p:cNvPicPr>
+          <p:nvPr/>
+        </p:nvPicPr>
+        <p:blipFill rotWithShape="1">
+          <a:blip r:embed="rId5">
+            <a:extLst>
+              <a:ext uri="{28A0092B-C50C-407E-A947-70E740481C1C}">
+                <a14:useLocalDpi xmlns:a14="http://schemas.microsoft.com/office/drawing/2010/main" val="0"/>
+              </a:ext>
+            </a:extLst>
+          </a:blip>
+          <a:srcRect r="2" b="3460"/>
+          <a:stretch/>
+        </p:blipFill>
+        <p:spPr bwMode="auto">
+          <a:xfrm>
+            <a:off x="2857444" y="188289"/>
+            <a:ext cx="7271148" cy="3443325"/>
           </a:xfrm>
           <a:prstGeom prst="rect">
             <a:avLst/>
@@ -11957,7 +14534,7 @@
           </p:nvPr>
         </p:nvPicPr>
         <p:blipFill rotWithShape="1">
-          <a:blip r:embed="rId2"/>
+          <a:blip r:embed="rId3"/>
           <a:srcRect r="8941"/>
           <a:stretch/>
         </p:blipFill>
@@ -12143,7 +14720,7 @@
         </p:xfrm>
         <a:graphic>
           <a:graphicData uri="http://schemas.openxmlformats.org/drawingml/2006/diagram">
-            <dgm:relIds xmlns:dgm="http://schemas.openxmlformats.org/drawingml/2006/diagram" xmlns:r="http://schemas.openxmlformats.org/officeDocument/2006/relationships" r:dm="rId2" r:lo="rId3" r:qs="rId4" r:cs="rId5"/>
+            <dgm:relIds xmlns:dgm="http://schemas.openxmlformats.org/drawingml/2006/diagram" xmlns:r="http://schemas.openxmlformats.org/officeDocument/2006/relationships" r:dm="rId3" r:lo="rId4" r:qs="rId5" r:cs="rId6"/>
           </a:graphicData>
         </a:graphic>
       </p:graphicFrame>
@@ -12238,7 +14815,7 @@
           </p:nvPr>
         </p:nvPicPr>
         <p:blipFill>
-          <a:blip r:embed="rId2">
+          <a:blip r:embed="rId3">
             <a:extLst>
               <a:ext uri="{28A0092B-C50C-407E-A947-70E740481C1C}">
                 <a14:useLocalDpi xmlns:a14="http://schemas.microsoft.com/office/drawing/2010/main" val="0"/>
@@ -12284,7 +14861,7 @@
           <p:nvPr/>
         </p:nvPicPr>
         <p:blipFill>
-          <a:blip r:embed="rId3">
+          <a:blip r:embed="rId4">
             <a:extLst>
               <a:ext uri="{28A0092B-C50C-407E-A947-70E740481C1C}">
                 <a14:useLocalDpi xmlns:a14="http://schemas.microsoft.com/office/drawing/2010/main" val="0"/>
@@ -12330,7 +14907,7 @@
           <p:nvPr/>
         </p:nvPicPr>
         <p:blipFill>
-          <a:blip r:embed="rId4">
+          <a:blip r:embed="rId5">
             <a:extLst>
               <a:ext uri="{28A0092B-C50C-407E-A947-70E740481C1C}">
                 <a14:useLocalDpi xmlns:a14="http://schemas.microsoft.com/office/drawing/2010/main" val="0"/>
@@ -12651,7 +15228,7 @@
           <a:p>
             <a:r>
               <a:rPr lang="en-US" sz="2400" dirty="0"/>
-              <a:t>Implementing multiclass multilabel classification for predicting the Primary Type of the Crime.</a:t>
+              <a:t>Implementing multiclass multilabel classification for predicting the Primary Type and Location of the Crime.</a:t>
             </a:r>
           </a:p>
           <a:p>
@@ -13269,4 +15846,299 @@
     </a:ext>
   </a:extLst>
 </a:theme>
+</file>
+
+<file path=ppt/theme/theme2.xml><?xml version="1.0" encoding="utf-8"?>
+<a:theme xmlns:a="http://schemas.openxmlformats.org/drawingml/2006/main" name="Office Theme">
+  <a:themeElements>
+    <a:clrScheme name="Office">
+      <a:dk1>
+        <a:sysClr val="windowText" lastClr="000000"/>
+      </a:dk1>
+      <a:lt1>
+        <a:sysClr val="window" lastClr="FFFFFF"/>
+      </a:lt1>
+      <a:dk2>
+        <a:srgbClr val="44546A"/>
+      </a:dk2>
+      <a:lt2>
+        <a:srgbClr val="E7E6E6"/>
+      </a:lt2>
+      <a:accent1>
+        <a:srgbClr val="4472C4"/>
+      </a:accent1>
+      <a:accent2>
+        <a:srgbClr val="ED7D31"/>
+      </a:accent2>
+      <a:accent3>
+        <a:srgbClr val="A5A5A5"/>
+      </a:accent3>
+      <a:accent4>
+        <a:srgbClr val="FFC000"/>
+      </a:accent4>
+      <a:accent5>
+        <a:srgbClr val="5B9BD5"/>
+      </a:accent5>
+      <a:accent6>
+        <a:srgbClr val="70AD47"/>
+      </a:accent6>
+      <a:hlink>
+        <a:srgbClr val="0563C1"/>
+      </a:hlink>
+      <a:folHlink>
+        <a:srgbClr val="954F72"/>
+      </a:folHlink>
+    </a:clrScheme>
+    <a:fontScheme name="Office">
+      <a:majorFont>
+        <a:latin typeface="Calibri Light" panose="020F0302020204030204"/>
+        <a:ea typeface=""/>
+        <a:cs typeface=""/>
+        <a:font script="Jpan" typeface="游ゴシック Light"/>
+        <a:font script="Hang" typeface="맑은 고딕"/>
+        <a:font script="Hans" typeface="等线 Light"/>
+        <a:font script="Hant" typeface="新細明體"/>
+        <a:font script="Arab" typeface="Times New Roman"/>
+        <a:font script="Hebr" typeface="Times New Roman"/>
+        <a:font script="Thai" typeface="Angsana New"/>
+        <a:font script="Ethi" typeface="Nyala"/>
+        <a:font script="Beng" typeface="Vrinda"/>
+        <a:font script="Gujr" typeface="Shruti"/>
+        <a:font script="Khmr" typeface="MoolBoran"/>
+        <a:font script="Knda" typeface="Tunga"/>
+        <a:font script="Guru" typeface="Raavi"/>
+        <a:font script="Cans" typeface="Euphemia"/>
+        <a:font script="Cher" typeface="Plantagenet Cherokee"/>
+        <a:font script="Yiii" typeface="Microsoft Yi Baiti"/>
+        <a:font script="Tibt" typeface="Microsoft Himalaya"/>
+        <a:font script="Thaa" typeface="MV Boli"/>
+        <a:font script="Deva" typeface="Mangal"/>
+        <a:font script="Telu" typeface="Gautami"/>
+        <a:font script="Taml" typeface="Latha"/>
+        <a:font script="Syrc" typeface="Estrangelo Edessa"/>
+        <a:font script="Orya" typeface="Kalinga"/>
+        <a:font script="Mlym" typeface="Kartika"/>
+        <a:font script="Laoo" typeface="DokChampa"/>
+        <a:font script="Sinh" typeface="Iskoola Pota"/>
+        <a:font script="Mong" typeface="Mongolian Baiti"/>
+        <a:font script="Viet" typeface="Times New Roman"/>
+        <a:font script="Uigh" typeface="Microsoft Uighur"/>
+        <a:font script="Geor" typeface="Sylfaen"/>
+        <a:font script="Armn" typeface="Arial"/>
+        <a:font script="Bugi" typeface="Leelawadee UI"/>
+        <a:font script="Bopo" typeface="Microsoft JhengHei"/>
+        <a:font script="Java" typeface="Javanese Text"/>
+        <a:font script="Lisu" typeface="Segoe UI"/>
+        <a:font script="Mymr" typeface="Myanmar Text"/>
+        <a:font script="Nkoo" typeface="Ebrima"/>
+        <a:font script="Olck" typeface="Nirmala UI"/>
+        <a:font script="Osma" typeface="Ebrima"/>
+        <a:font script="Phag" typeface="Phagspa"/>
+        <a:font script="Syrn" typeface="Estrangelo Edessa"/>
+        <a:font script="Syrj" typeface="Estrangelo Edessa"/>
+        <a:font script="Syre" typeface="Estrangelo Edessa"/>
+        <a:font script="Sora" typeface="Nirmala UI"/>
+        <a:font script="Tale" typeface="Microsoft Tai Le"/>
+        <a:font script="Talu" typeface="Microsoft New Tai Lue"/>
+        <a:font script="Tfng" typeface="Ebrima"/>
+      </a:majorFont>
+      <a:minorFont>
+        <a:latin typeface="Calibri" panose="020F0502020204030204"/>
+        <a:ea typeface=""/>
+        <a:cs typeface=""/>
+        <a:font script="Jpan" typeface="游ゴシック"/>
+        <a:font script="Hang" typeface="맑은 고딕"/>
+        <a:font script="Hans" typeface="等线"/>
+        <a:font script="Hant" typeface="新細明體"/>
+        <a:font script="Arab" typeface="Arial"/>
+        <a:font script="Hebr" typeface="Arial"/>
+        <a:font script="Thai" typeface="Cordia New"/>
+        <a:font script="Ethi" typeface="Nyala"/>
+        <a:font script="Beng" typeface="Vrinda"/>
+        <a:font script="Gujr" typeface="Shruti"/>
+        <a:font script="Khmr" typeface="DaunPenh"/>
+        <a:font script="Knda" typeface="Tunga"/>
+        <a:font script="Guru" typeface="Raavi"/>
+        <a:font script="Cans" typeface="Euphemia"/>
+        <a:font script="Cher" typeface="Plantagenet Cherokee"/>
+        <a:font script="Yiii" typeface="Microsoft Yi Baiti"/>
+        <a:font script="Tibt" typeface="Microsoft Himalaya"/>
+        <a:font script="Thaa" typeface="MV Boli"/>
+        <a:font script="Deva" typeface="Mangal"/>
+        <a:font script="Telu" typeface="Gautami"/>
+        <a:font script="Taml" typeface="Latha"/>
+        <a:font script="Syrc" typeface="Estrangelo Edessa"/>
+        <a:font script="Orya" typeface="Kalinga"/>
+        <a:font script="Mlym" typeface="Kartika"/>
+        <a:font script="Laoo" typeface="DokChampa"/>
+        <a:font script="Sinh" typeface="Iskoola Pota"/>
+        <a:font script="Mong" typeface="Mongolian Baiti"/>
+        <a:font script="Viet" typeface="Arial"/>
+        <a:font script="Uigh" typeface="Microsoft Uighur"/>
+        <a:font script="Geor" typeface="Sylfaen"/>
+        <a:font script="Armn" typeface="Arial"/>
+        <a:font script="Bugi" typeface="Leelawadee UI"/>
+        <a:font script="Bopo" typeface="Microsoft JhengHei"/>
+        <a:font script="Java" typeface="Javanese Text"/>
+        <a:font script="Lisu" typeface="Segoe UI"/>
+        <a:font script="Mymr" typeface="Myanmar Text"/>
+        <a:font script="Nkoo" typeface="Ebrima"/>
+        <a:font script="Olck" typeface="Nirmala UI"/>
+        <a:font script="Osma" typeface="Ebrima"/>
+        <a:font script="Phag" typeface="Phagspa"/>
+        <a:font script="Syrn" typeface="Estrangelo Edessa"/>
+        <a:font script="Syrj" typeface="Estrangelo Edessa"/>
+        <a:font script="Syre" typeface="Estrangelo Edessa"/>
+        <a:font script="Sora" typeface="Nirmala UI"/>
+        <a:font script="Tale" typeface="Microsoft Tai Le"/>
+        <a:font script="Talu" typeface="Microsoft New Tai Lue"/>
+        <a:font script="Tfng" typeface="Ebrima"/>
+      </a:minorFont>
+    </a:fontScheme>
+    <a:fmtScheme name="Office">
+      <a:fillStyleLst>
+        <a:solidFill>
+          <a:schemeClr val="phClr"/>
+        </a:solidFill>
+        <a:gradFill rotWithShape="1">
+          <a:gsLst>
+            <a:gs pos="0">
+              <a:schemeClr val="phClr">
+                <a:lumMod val="110000"/>
+                <a:satMod val="105000"/>
+                <a:tint val="67000"/>
+              </a:schemeClr>
+            </a:gs>
+            <a:gs pos="50000">
+              <a:schemeClr val="phClr">
+                <a:lumMod val="105000"/>
+                <a:satMod val="103000"/>
+                <a:tint val="73000"/>
+              </a:schemeClr>
+            </a:gs>
+            <a:gs pos="100000">
+              <a:schemeClr val="phClr">
+                <a:lumMod val="105000"/>
+                <a:satMod val="109000"/>
+                <a:tint val="81000"/>
+              </a:schemeClr>
+            </a:gs>
+          </a:gsLst>
+          <a:lin ang="5400000" scaled="0"/>
+        </a:gradFill>
+        <a:gradFill rotWithShape="1">
+          <a:gsLst>
+            <a:gs pos="0">
+              <a:schemeClr val="phClr">
+                <a:satMod val="103000"/>
+                <a:lumMod val="102000"/>
+                <a:tint val="94000"/>
+              </a:schemeClr>
+            </a:gs>
+            <a:gs pos="50000">
+              <a:schemeClr val="phClr">
+                <a:satMod val="110000"/>
+                <a:lumMod val="100000"/>
+                <a:shade val="100000"/>
+              </a:schemeClr>
+            </a:gs>
+            <a:gs pos="100000">
+              <a:schemeClr val="phClr">
+                <a:lumMod val="99000"/>
+                <a:satMod val="120000"/>
+                <a:shade val="78000"/>
+              </a:schemeClr>
+            </a:gs>
+          </a:gsLst>
+          <a:lin ang="5400000" scaled="0"/>
+        </a:gradFill>
+      </a:fillStyleLst>
+      <a:lnStyleLst>
+        <a:ln w="6350" cap="flat" cmpd="sng" algn="ctr">
+          <a:solidFill>
+            <a:schemeClr val="phClr"/>
+          </a:solidFill>
+          <a:prstDash val="solid"/>
+          <a:miter lim="800000"/>
+        </a:ln>
+        <a:ln w="12700" cap="flat" cmpd="sng" algn="ctr">
+          <a:solidFill>
+            <a:schemeClr val="phClr"/>
+          </a:solidFill>
+          <a:prstDash val="solid"/>
+          <a:miter lim="800000"/>
+        </a:ln>
+        <a:ln w="19050" cap="flat" cmpd="sng" algn="ctr">
+          <a:solidFill>
+            <a:schemeClr val="phClr"/>
+          </a:solidFill>
+          <a:prstDash val="solid"/>
+          <a:miter lim="800000"/>
+        </a:ln>
+      </a:lnStyleLst>
+      <a:effectStyleLst>
+        <a:effectStyle>
+          <a:effectLst/>
+        </a:effectStyle>
+        <a:effectStyle>
+          <a:effectLst/>
+        </a:effectStyle>
+        <a:effectStyle>
+          <a:effectLst>
+            <a:outerShdw blurRad="57150" dist="19050" dir="5400000" algn="ctr" rotWithShape="0">
+              <a:srgbClr val="000000">
+                <a:alpha val="63000"/>
+              </a:srgbClr>
+            </a:outerShdw>
+          </a:effectLst>
+        </a:effectStyle>
+      </a:effectStyleLst>
+      <a:bgFillStyleLst>
+        <a:solidFill>
+          <a:schemeClr val="phClr"/>
+        </a:solidFill>
+        <a:solidFill>
+          <a:schemeClr val="phClr">
+            <a:tint val="95000"/>
+            <a:satMod val="170000"/>
+          </a:schemeClr>
+        </a:solidFill>
+        <a:gradFill rotWithShape="1">
+          <a:gsLst>
+            <a:gs pos="0">
+              <a:schemeClr val="phClr">
+                <a:tint val="93000"/>
+                <a:satMod val="150000"/>
+                <a:shade val="98000"/>
+                <a:lumMod val="102000"/>
+              </a:schemeClr>
+            </a:gs>
+            <a:gs pos="50000">
+              <a:schemeClr val="phClr">
+                <a:tint val="98000"/>
+                <a:satMod val="130000"/>
+                <a:shade val="90000"/>
+                <a:lumMod val="103000"/>
+              </a:schemeClr>
+            </a:gs>
+            <a:gs pos="100000">
+              <a:schemeClr val="phClr">
+                <a:shade val="63000"/>
+                <a:satMod val="120000"/>
+              </a:schemeClr>
+            </a:gs>
+          </a:gsLst>
+          <a:lin ang="5400000" scaled="0"/>
+        </a:gradFill>
+      </a:bgFillStyleLst>
+    </a:fmtScheme>
+  </a:themeElements>
+  <a:objectDefaults/>
+  <a:extraClrSchemeLst/>
+  <a:extLst>
+    <a:ext uri="{05A4C25C-085E-4340-85A3-A5531E510DB2}">
+      <thm15:themeFamily xmlns:thm15="http://schemas.microsoft.com/office/thememl/2012/main" name="Office Theme" id="{62F939B6-93AF-4DB8-9C6B-D6C7DFDC589F}" vid="{4A3C46E8-61CC-4603-A589-7422A47A8E4A}"/>
+    </a:ext>
+  </a:extLst>
+</a:theme>
 </file>
</xml_diff>